<commit_message>
update -  work in progress..
git-svn-id: file://localhost/tmp/svn2git/svn@3097 defb5e50-622e-49ec-a68e-d72c7db87b45
</commit_message>
<xml_diff>
--- a/tutorial/general_tutorial/SAGA-Intro-Conclusion.pptx
+++ b/tutorial/general_tutorial/SAGA-Intro-Conclusion.pptx
@@ -7,23 +7,27 @@
     <p:sldMasterId id="2147483678" r:id="rId3"/>
   </p:sldMasterIdLst>
   <p:notesMasterIdLst>
-    <p:notesMasterId r:id="rId15"/>
+    <p:notesMasterId r:id="rId19"/>
   </p:notesMasterIdLst>
   <p:handoutMasterIdLst>
-    <p:handoutMasterId r:id="rId16"/>
+    <p:handoutMasterId r:id="rId20"/>
   </p:handoutMasterIdLst>
   <p:sldIdLst>
     <p:sldId id="256" r:id="rId4"/>
-    <p:sldId id="260" r:id="rId5"/>
-    <p:sldId id="261" r:id="rId6"/>
-    <p:sldId id="262" r:id="rId7"/>
-    <p:sldId id="263" r:id="rId8"/>
-    <p:sldId id="264" r:id="rId9"/>
+    <p:sldId id="261" r:id="rId5"/>
+    <p:sldId id="262" r:id="rId6"/>
+    <p:sldId id="263" r:id="rId7"/>
+    <p:sldId id="264" r:id="rId8"/>
+    <p:sldId id="273" r:id="rId9"/>
     <p:sldId id="265" r:id="rId10"/>
     <p:sldId id="266" r:id="rId11"/>
-    <p:sldId id="267" r:id="rId12"/>
-    <p:sldId id="268" r:id="rId13"/>
-    <p:sldId id="269" r:id="rId14"/>
+    <p:sldId id="270" r:id="rId12"/>
+    <p:sldId id="271" r:id="rId13"/>
+    <p:sldId id="272" r:id="rId14"/>
+    <p:sldId id="268" r:id="rId15"/>
+    <p:sldId id="269" r:id="rId16"/>
+    <p:sldId id="274" r:id="rId17"/>
+    <p:sldId id="267" r:id="rId18"/>
   </p:sldIdLst>
   <p:sldSz cx="9144000" cy="6858000" type="screen4x3"/>
   <p:notesSz cx="6858000" cy="9144000"/>
@@ -125,6 +129,690 @@
 </p:presentation>
 </file>
 
+<file path=ppt/charts/chart1.xml><?xml version="1.0" encoding="utf-8"?>
+<c:chartSpace xmlns:c="http://schemas.openxmlformats.org/drawingml/2006/chart" xmlns:a="http://schemas.openxmlformats.org/drawingml/2006/main" xmlns:r="http://schemas.openxmlformats.org/officeDocument/2006/relationships">
+  <c:date1904 val="1"/>
+  <c:lang val="en-US"/>
+  <c:style val="18"/>
+  <c:chart>
+    <c:plotArea>
+      <c:layout/>
+      <c:barChart>
+        <c:barDir val="col"/>
+        <c:grouping val="clustered"/>
+        <c:ser>
+          <c:idx val="0"/>
+          <c:order val="0"/>
+          <c:tx>
+            <c:strRef>
+              <c:f>Sheet1!$A$3</c:f>
+              <c:strCache>
+                <c:ptCount val="1"/>
+                <c:pt idx="0">
+                  <c:v>Synchronous</c:v>
+                </c:pt>
+              </c:strCache>
+            </c:strRef>
+          </c:tx>
+          <c:errBars>
+            <c:errBarType val="both"/>
+            <c:errValType val="cust"/>
+            <c:plus>
+              <c:numRef>
+                <c:f>(Sheet1!$C$3,Sheet1!$E$3,Sheet1!$G$3,Sheet1!$I$3)</c:f>
+                <c:numCache>
+                  <c:formatCode>General</c:formatCode>
+                  <c:ptCount val="4"/>
+                  <c:pt idx="0">
+                    <c:v>8.81</c:v>
+                  </c:pt>
+                  <c:pt idx="1">
+                    <c:v>11.2</c:v>
+                  </c:pt>
+                  <c:pt idx="2">
+                    <c:v>17.0</c:v>
+                  </c:pt>
+                  <c:pt idx="3">
+                    <c:v>18.34</c:v>
+                  </c:pt>
+                </c:numCache>
+              </c:numRef>
+            </c:plus>
+            <c:minus>
+              <c:numRef>
+                <c:f>(Sheet1!$C$3,Sheet1!$E$3,Sheet1!$G$3,Sheet1!$I$3)</c:f>
+                <c:numCache>
+                  <c:formatCode>General</c:formatCode>
+                  <c:ptCount val="4"/>
+                  <c:pt idx="0">
+                    <c:v>8.81</c:v>
+                  </c:pt>
+                  <c:pt idx="1">
+                    <c:v>11.2</c:v>
+                  </c:pt>
+                  <c:pt idx="2">
+                    <c:v>17.0</c:v>
+                  </c:pt>
+                  <c:pt idx="3">
+                    <c:v>18.34</c:v>
+                  </c:pt>
+                </c:numCache>
+              </c:numRef>
+            </c:minus>
+          </c:errBars>
+          <c:cat>
+            <c:strRef>
+              <c:f>(Sheet1!$B$2,Sheet1!$D$2,Sheet1!$F$2,Sheet1!$H$2,Sheet1!$J$2,Sheet1!$L$2,Sheet1!$N$2)</c:f>
+              <c:strCache>
+                <c:ptCount val="7"/>
+                <c:pt idx="0">
+                  <c:v>4 replicas/16 exchanges</c:v>
+                </c:pt>
+                <c:pt idx="1">
+                  <c:v>8 replicas/32 exchanges</c:v>
+                </c:pt>
+                <c:pt idx="2">
+                  <c:v>16/64</c:v>
+                </c:pt>
+                <c:pt idx="3">
+                  <c:v>32/128</c:v>
+                </c:pt>
+                <c:pt idx="4">
+                  <c:v>64/256</c:v>
+                </c:pt>
+                <c:pt idx="5">
+                  <c:v>128/512</c:v>
+                </c:pt>
+                <c:pt idx="6">
+                  <c:v>256/1024</c:v>
+                </c:pt>
+              </c:strCache>
+            </c:strRef>
+          </c:cat>
+          <c:val>
+            <c:numRef>
+              <c:f>(Sheet1!$B$3,Sheet1!$D$3,Sheet1!$F$3,Sheet1!$H$3,Sheet1!$J$3,Sheet1!$L$3,Sheet1!$N$3)</c:f>
+              <c:numCache>
+                <c:formatCode>General</c:formatCode>
+                <c:ptCount val="7"/>
+                <c:pt idx="0">
+                  <c:v>624.0</c:v>
+                </c:pt>
+                <c:pt idx="1">
+                  <c:v>685.0</c:v>
+                </c:pt>
+                <c:pt idx="2">
+                  <c:v>802.0</c:v>
+                </c:pt>
+                <c:pt idx="3">
+                  <c:v>1023.0</c:v>
+                </c:pt>
+              </c:numCache>
+            </c:numRef>
+          </c:val>
+        </c:ser>
+        <c:ser>
+          <c:idx val="1"/>
+          <c:order val="1"/>
+          <c:tx>
+            <c:strRef>
+              <c:f>Sheet1!$A$4</c:f>
+              <c:strCache>
+                <c:ptCount val="1"/>
+                <c:pt idx="0">
+                  <c:v>Asynchronous - Centralized</c:v>
+                </c:pt>
+              </c:strCache>
+            </c:strRef>
+          </c:tx>
+          <c:errBars>
+            <c:errBarType val="both"/>
+            <c:errValType val="cust"/>
+            <c:plus>
+              <c:numRef>
+                <c:f>(Sheet1!$C$4,Sheet1!$E$4,Sheet1!$G$4,Sheet1!$I$4,Sheet1!$K$4)</c:f>
+                <c:numCache>
+                  <c:formatCode>General</c:formatCode>
+                  <c:ptCount val="5"/>
+                  <c:pt idx="0">
+                    <c:v>11.1</c:v>
+                  </c:pt>
+                  <c:pt idx="1">
+                    <c:v>3.23</c:v>
+                  </c:pt>
+                  <c:pt idx="2">
+                    <c:v>16.36</c:v>
+                  </c:pt>
+                  <c:pt idx="3">
+                    <c:v>13.4</c:v>
+                  </c:pt>
+                  <c:pt idx="4">
+                    <c:v>19.2</c:v>
+                  </c:pt>
+                </c:numCache>
+              </c:numRef>
+            </c:plus>
+            <c:minus>
+              <c:numRef>
+                <c:f>(Sheet1!$C$4,Sheet1!$E$4,Sheet1!$G$4,Sheet1!$I$4,Sheet1!$K$4)</c:f>
+                <c:numCache>
+                  <c:formatCode>General</c:formatCode>
+                  <c:ptCount val="5"/>
+                  <c:pt idx="0">
+                    <c:v>11.1</c:v>
+                  </c:pt>
+                  <c:pt idx="1">
+                    <c:v>3.23</c:v>
+                  </c:pt>
+                  <c:pt idx="2">
+                    <c:v>16.36</c:v>
+                  </c:pt>
+                  <c:pt idx="3">
+                    <c:v>13.4</c:v>
+                  </c:pt>
+                  <c:pt idx="4">
+                    <c:v>19.2</c:v>
+                  </c:pt>
+                </c:numCache>
+              </c:numRef>
+            </c:minus>
+          </c:errBars>
+          <c:cat>
+            <c:strRef>
+              <c:f>(Sheet1!$B$2,Sheet1!$D$2,Sheet1!$F$2,Sheet1!$H$2,Sheet1!$J$2,Sheet1!$L$2,Sheet1!$N$2)</c:f>
+              <c:strCache>
+                <c:ptCount val="7"/>
+                <c:pt idx="0">
+                  <c:v>4 replicas/16 exchanges</c:v>
+                </c:pt>
+                <c:pt idx="1">
+                  <c:v>8 replicas/32 exchanges</c:v>
+                </c:pt>
+                <c:pt idx="2">
+                  <c:v>16/64</c:v>
+                </c:pt>
+                <c:pt idx="3">
+                  <c:v>32/128</c:v>
+                </c:pt>
+                <c:pt idx="4">
+                  <c:v>64/256</c:v>
+                </c:pt>
+                <c:pt idx="5">
+                  <c:v>128/512</c:v>
+                </c:pt>
+                <c:pt idx="6">
+                  <c:v>256/1024</c:v>
+                </c:pt>
+              </c:strCache>
+            </c:strRef>
+          </c:cat>
+          <c:val>
+            <c:numRef>
+              <c:f>(Sheet1!$B$4,Sheet1!$D$4,Sheet1!$F$4,Sheet1!$H$4,Sheet1!$J$4,Sheet1!$L$4,Sheet1!$N$4)</c:f>
+              <c:numCache>
+                <c:formatCode>General</c:formatCode>
+                <c:ptCount val="7"/>
+                <c:pt idx="0">
+                  <c:v>628.6</c:v>
+                </c:pt>
+                <c:pt idx="1">
+                  <c:v>630.0</c:v>
+                </c:pt>
+                <c:pt idx="2">
+                  <c:v>701.83</c:v>
+                </c:pt>
+                <c:pt idx="3">
+                  <c:v>804.0</c:v>
+                </c:pt>
+                <c:pt idx="4">
+                  <c:v>1097.0</c:v>
+                </c:pt>
+                <c:pt idx="5">
+                  <c:v>1893.0</c:v>
+                </c:pt>
+              </c:numCache>
+            </c:numRef>
+          </c:val>
+        </c:ser>
+        <c:ser>
+          <c:idx val="2"/>
+          <c:order val="2"/>
+          <c:tx>
+            <c:strRef>
+              <c:f>Sheet1!$A$5</c:f>
+              <c:strCache>
+                <c:ptCount val="1"/>
+                <c:pt idx="0">
+                  <c:v>Asynchronous - Decentralized</c:v>
+                </c:pt>
+              </c:strCache>
+            </c:strRef>
+          </c:tx>
+          <c:errBars>
+            <c:errBarType val="both"/>
+            <c:errValType val="cust"/>
+            <c:plus>
+              <c:numRef>
+                <c:f>(Sheet1!$C$5,Sheet1!$E$5,Sheet1!$G$5,Sheet1!$I$5,Sheet1!$K$5,Sheet1!$M$5,Sheet1!$O$5)</c:f>
+                <c:numCache>
+                  <c:formatCode>General</c:formatCode>
+                  <c:ptCount val="7"/>
+                  <c:pt idx="0">
+                    <c:v>5.97</c:v>
+                  </c:pt>
+                  <c:pt idx="1">
+                    <c:v>6.14</c:v>
+                  </c:pt>
+                  <c:pt idx="2">
+                    <c:v>3.38</c:v>
+                  </c:pt>
+                  <c:pt idx="3">
+                    <c:v>4.24</c:v>
+                  </c:pt>
+                  <c:pt idx="4">
+                    <c:v>3.77</c:v>
+                  </c:pt>
+                  <c:pt idx="5">
+                    <c:v>8.6</c:v>
+                  </c:pt>
+                  <c:pt idx="6">
+                    <c:v>25.4</c:v>
+                  </c:pt>
+                </c:numCache>
+              </c:numRef>
+            </c:plus>
+            <c:minus>
+              <c:numRef>
+                <c:f>(Sheet1!$C$5,Sheet1!$E$5,Sheet1!$G$5,Sheet1!$I$5,Sheet1!$K$5,Sheet1!$M$5,Sheet1!$O$5)</c:f>
+                <c:numCache>
+                  <c:formatCode>General</c:formatCode>
+                  <c:ptCount val="7"/>
+                  <c:pt idx="0">
+                    <c:v>5.97</c:v>
+                  </c:pt>
+                  <c:pt idx="1">
+                    <c:v>6.14</c:v>
+                  </c:pt>
+                  <c:pt idx="2">
+                    <c:v>3.38</c:v>
+                  </c:pt>
+                  <c:pt idx="3">
+                    <c:v>4.24</c:v>
+                  </c:pt>
+                  <c:pt idx="4">
+                    <c:v>3.77</c:v>
+                  </c:pt>
+                  <c:pt idx="5">
+                    <c:v>8.6</c:v>
+                  </c:pt>
+                  <c:pt idx="6">
+                    <c:v>25.4</c:v>
+                  </c:pt>
+                </c:numCache>
+              </c:numRef>
+            </c:minus>
+          </c:errBars>
+          <c:cat>
+            <c:strRef>
+              <c:f>(Sheet1!$B$2,Sheet1!$D$2,Sheet1!$F$2,Sheet1!$H$2,Sheet1!$J$2,Sheet1!$L$2,Sheet1!$N$2)</c:f>
+              <c:strCache>
+                <c:ptCount val="7"/>
+                <c:pt idx="0">
+                  <c:v>4 replicas/16 exchanges</c:v>
+                </c:pt>
+                <c:pt idx="1">
+                  <c:v>8 replicas/32 exchanges</c:v>
+                </c:pt>
+                <c:pt idx="2">
+                  <c:v>16/64</c:v>
+                </c:pt>
+                <c:pt idx="3">
+                  <c:v>32/128</c:v>
+                </c:pt>
+                <c:pt idx="4">
+                  <c:v>64/256</c:v>
+                </c:pt>
+                <c:pt idx="5">
+                  <c:v>128/512</c:v>
+                </c:pt>
+                <c:pt idx="6">
+                  <c:v>256/1024</c:v>
+                </c:pt>
+              </c:strCache>
+            </c:strRef>
+          </c:cat>
+          <c:val>
+            <c:numRef>
+              <c:f>(Sheet1!$B$5,Sheet1!$D$5,Sheet1!$F$5,Sheet1!$H$5,Sheet1!$J$5,Sheet1!$L$5,Sheet1!$N$5)</c:f>
+              <c:numCache>
+                <c:formatCode>General</c:formatCode>
+                <c:ptCount val="7"/>
+                <c:pt idx="0">
+                  <c:v>588.9</c:v>
+                </c:pt>
+                <c:pt idx="1">
+                  <c:v>609.0</c:v>
+                </c:pt>
+                <c:pt idx="2">
+                  <c:v>583.33</c:v>
+                </c:pt>
+                <c:pt idx="3">
+                  <c:v>641.0</c:v>
+                </c:pt>
+                <c:pt idx="4">
+                  <c:v>660.0</c:v>
+                </c:pt>
+                <c:pt idx="5">
+                  <c:v>784.0</c:v>
+                </c:pt>
+                <c:pt idx="6">
+                  <c:v>882.0</c:v>
+                </c:pt>
+              </c:numCache>
+            </c:numRef>
+          </c:val>
+        </c:ser>
+        <c:axId val="177944104"/>
+        <c:axId val="146823016"/>
+      </c:barChart>
+      <c:catAx>
+        <c:axId val="177944104"/>
+        <c:scaling>
+          <c:orientation val="minMax"/>
+        </c:scaling>
+        <c:axPos val="b"/>
+        <c:tickLblPos val="nextTo"/>
+        <c:crossAx val="146823016"/>
+        <c:crosses val="autoZero"/>
+        <c:auto val="1"/>
+        <c:lblAlgn val="ctr"/>
+        <c:lblOffset val="100"/>
+      </c:catAx>
+      <c:valAx>
+        <c:axId val="146823016"/>
+        <c:scaling>
+          <c:orientation val="minMax"/>
+        </c:scaling>
+        <c:axPos val="l"/>
+        <c:majorGridlines/>
+        <c:numFmt formatCode="General" sourceLinked="1"/>
+        <c:tickLblPos val="nextTo"/>
+        <c:crossAx val="177944104"/>
+        <c:crosses val="autoZero"/>
+        <c:crossBetween val="between"/>
+      </c:valAx>
+    </c:plotArea>
+    <c:legend>
+      <c:legendPos val="r"/>
+      <c:layout/>
+    </c:legend>
+    <c:plotVisOnly val="1"/>
+  </c:chart>
+  <c:externalData r:id="rId1"/>
+</c:chartSpace>
+</file>
+
+<file path=ppt/charts/chart2.xml><?xml version="1.0" encoding="utf-8"?>
+<c:chartSpace xmlns:c="http://schemas.openxmlformats.org/drawingml/2006/chart" xmlns:a="http://schemas.openxmlformats.org/drawingml/2006/main" xmlns:r="http://schemas.openxmlformats.org/officeDocument/2006/relationships">
+  <c:date1904 val="1"/>
+  <c:lang val="en-US"/>
+  <c:style val="18"/>
+  <c:chart>
+    <c:plotArea>
+      <c:layout/>
+      <c:barChart>
+        <c:barDir val="col"/>
+        <c:grouping val="clustered"/>
+        <c:ser>
+          <c:idx val="0"/>
+          <c:order val="0"/>
+          <c:tx>
+            <c:v>Synchronous</c:v>
+          </c:tx>
+          <c:errBars>
+            <c:errBarType val="both"/>
+            <c:errValType val="cust"/>
+            <c:plus>
+              <c:numRef>
+                <c:f>(Sheet1!$C$43,Sheet1!$E$43)</c:f>
+                <c:numCache>
+                  <c:formatCode>General</c:formatCode>
+                  <c:ptCount val="2"/>
+                  <c:pt idx="0">
+                    <c:v>14.5</c:v>
+                  </c:pt>
+                  <c:pt idx="1">
+                    <c:v>10.05</c:v>
+                  </c:pt>
+                </c:numCache>
+              </c:numRef>
+            </c:plus>
+            <c:minus>
+              <c:numRef>
+                <c:f>(Sheet1!$C$43,Sheet1!$E$43)</c:f>
+                <c:numCache>
+                  <c:formatCode>General</c:formatCode>
+                  <c:ptCount val="2"/>
+                  <c:pt idx="0">
+                    <c:v>14.5</c:v>
+                  </c:pt>
+                  <c:pt idx="1">
+                    <c:v>10.05</c:v>
+                  </c:pt>
+                </c:numCache>
+              </c:numRef>
+            </c:minus>
+          </c:errBars>
+          <c:cat>
+            <c:strRef>
+              <c:f>Sheet1!$B$38:$C$38</c:f>
+              <c:strCache>
+                <c:ptCount val="2"/>
+                <c:pt idx="0">
+                  <c:v>4BJs, 4Machines - 16 replicas/64 exchanges</c:v>
+                </c:pt>
+                <c:pt idx="1">
+                  <c:v>2BJs 2Machines, 8 replicas, 32 exchanges</c:v>
+                </c:pt>
+              </c:strCache>
+            </c:strRef>
+          </c:cat>
+          <c:val>
+            <c:numRef>
+              <c:f>Sheet1!$B$39:$C$39</c:f>
+              <c:numCache>
+                <c:formatCode>General</c:formatCode>
+                <c:ptCount val="2"/>
+                <c:pt idx="0">
+                  <c:v>1179.8</c:v>
+                </c:pt>
+                <c:pt idx="1">
+                  <c:v>805.0</c:v>
+                </c:pt>
+              </c:numCache>
+            </c:numRef>
+          </c:val>
+        </c:ser>
+        <c:ser>
+          <c:idx val="1"/>
+          <c:order val="1"/>
+          <c:tx>
+            <c:v>Asynchronous-Centralized</c:v>
+          </c:tx>
+          <c:errBars>
+            <c:errBarType val="both"/>
+            <c:errValType val="cust"/>
+            <c:plus>
+              <c:numRef>
+                <c:f>(Sheet1!$C$44,Sheet1!$E$44)</c:f>
+                <c:numCache>
+                  <c:formatCode>General</c:formatCode>
+                  <c:ptCount val="2"/>
+                  <c:pt idx="0">
+                    <c:v>7.11</c:v>
+                  </c:pt>
+                  <c:pt idx="1">
+                    <c:v>5.57</c:v>
+                  </c:pt>
+                </c:numCache>
+              </c:numRef>
+            </c:plus>
+            <c:minus>
+              <c:numRef>
+                <c:f>(Sheet1!$C$44,Sheet1!$E$44)</c:f>
+                <c:numCache>
+                  <c:formatCode>General</c:formatCode>
+                  <c:ptCount val="2"/>
+                  <c:pt idx="0">
+                    <c:v>7.11</c:v>
+                  </c:pt>
+                  <c:pt idx="1">
+                    <c:v>5.57</c:v>
+                  </c:pt>
+                </c:numCache>
+              </c:numRef>
+            </c:minus>
+          </c:errBars>
+          <c:cat>
+            <c:strRef>
+              <c:f>Sheet1!$B$38:$C$38</c:f>
+              <c:strCache>
+                <c:ptCount val="2"/>
+                <c:pt idx="0">
+                  <c:v>4BJs, 4Machines - 16 replicas/64 exchanges</c:v>
+                </c:pt>
+                <c:pt idx="1">
+                  <c:v>2BJs 2Machines, 8 replicas, 32 exchanges</c:v>
+                </c:pt>
+              </c:strCache>
+            </c:strRef>
+          </c:cat>
+          <c:val>
+            <c:numRef>
+              <c:f>Sheet1!$B$40:$C$40</c:f>
+              <c:numCache>
+                <c:formatCode>General</c:formatCode>
+                <c:ptCount val="2"/>
+                <c:pt idx="0">
+                  <c:v>685.0</c:v>
+                </c:pt>
+                <c:pt idx="1">
+                  <c:v>632.0</c:v>
+                </c:pt>
+              </c:numCache>
+            </c:numRef>
+          </c:val>
+        </c:ser>
+        <c:ser>
+          <c:idx val="2"/>
+          <c:order val="2"/>
+          <c:tx>
+            <c:v>Asynchronous-Decentralized</c:v>
+          </c:tx>
+          <c:errBars>
+            <c:errBarType val="both"/>
+            <c:errValType val="cust"/>
+            <c:plus>
+              <c:numRef>
+                <c:f>(Sheet1!$C$45,Sheet1!$E$45)</c:f>
+                <c:numCache>
+                  <c:formatCode>General</c:formatCode>
+                  <c:ptCount val="2"/>
+                  <c:pt idx="0">
+                    <c:v>1.66</c:v>
+                  </c:pt>
+                  <c:pt idx="1">
+                    <c:v>9.17</c:v>
+                  </c:pt>
+                </c:numCache>
+              </c:numRef>
+            </c:plus>
+            <c:minus>
+              <c:numRef>
+                <c:f>(Sheet1!$C$45,Sheet1!$E$45)</c:f>
+                <c:numCache>
+                  <c:formatCode>General</c:formatCode>
+                  <c:ptCount val="2"/>
+                  <c:pt idx="0">
+                    <c:v>1.66</c:v>
+                  </c:pt>
+                  <c:pt idx="1">
+                    <c:v>9.17</c:v>
+                  </c:pt>
+                </c:numCache>
+              </c:numRef>
+            </c:minus>
+          </c:errBars>
+          <c:cat>
+            <c:strRef>
+              <c:f>Sheet1!$B$38:$C$38</c:f>
+              <c:strCache>
+                <c:ptCount val="2"/>
+                <c:pt idx="0">
+                  <c:v>4BJs, 4Machines - 16 replicas/64 exchanges</c:v>
+                </c:pt>
+                <c:pt idx="1">
+                  <c:v>2BJs 2Machines, 8 replicas, 32 exchanges</c:v>
+                </c:pt>
+              </c:strCache>
+            </c:strRef>
+          </c:cat>
+          <c:val>
+            <c:numRef>
+              <c:f>Sheet1!$B$41:$C$41</c:f>
+              <c:numCache>
+                <c:formatCode>General</c:formatCode>
+                <c:ptCount val="2"/>
+                <c:pt idx="0">
+                  <c:v>641.0</c:v>
+                </c:pt>
+                <c:pt idx="1">
+                  <c:v>607.8</c:v>
+                </c:pt>
+              </c:numCache>
+            </c:numRef>
+          </c:val>
+        </c:ser>
+        <c:axId val="68804280"/>
+        <c:axId val="467493992"/>
+      </c:barChart>
+      <c:catAx>
+        <c:axId val="68804280"/>
+        <c:scaling>
+          <c:orientation val="minMax"/>
+        </c:scaling>
+        <c:axPos val="b"/>
+        <c:tickLblPos val="nextTo"/>
+        <c:crossAx val="467493992"/>
+        <c:crosses val="autoZero"/>
+        <c:auto val="1"/>
+        <c:lblAlgn val="ctr"/>
+        <c:lblOffset val="100"/>
+      </c:catAx>
+      <c:valAx>
+        <c:axId val="467493992"/>
+        <c:scaling>
+          <c:orientation val="minMax"/>
+        </c:scaling>
+        <c:axPos val="l"/>
+        <c:majorGridlines/>
+        <c:numFmt formatCode="General" sourceLinked="1"/>
+        <c:tickLblPos val="nextTo"/>
+        <c:crossAx val="68804280"/>
+        <c:crosses val="autoZero"/>
+        <c:crossBetween val="between"/>
+      </c:valAx>
+    </c:plotArea>
+    <c:legend>
+      <c:legendPos val="r"/>
+      <c:layout/>
+    </c:legend>
+    <c:plotVisOnly val="1"/>
+  </c:chart>
+  <c:externalData r:id="rId1"/>
+</c:chartSpace>
+</file>
+
 <file path=ppt/handoutMasters/handoutMaster1.xml><?xml version="1.0" encoding="utf-8"?>
 <p:handoutMaster xmlns:a="http://schemas.openxmlformats.org/drawingml/2006/main" xmlns:r="http://schemas.openxmlformats.org/officeDocument/2006/relationships" xmlns:mc="http://schemas.openxmlformats.org/markup-compatibility/2006" xmlns:mv="urn:schemas-microsoft-com:mac:vml" xmlns:p="http://schemas.openxmlformats.org/presentationml/2006/main" mc:Ignorable="mv" mc:PreserveAttributes="mv:*">
   <p:cSld>
@@ -208,7 +896,7 @@
             <a:fld id="{9A6AC4B2-6F12-454D-8DA7-7B9C78843B81}" type="datetimeFigureOut">
               <a:rPr lang="en-US" smtClean="0"/>
               <a:pPr/>
-              <a:t>10/19/10</a:t>
+              <a:t>10/20/10</a:t>
             </a:fld>
             <a:endParaRPr lang="en-US"/>
           </a:p>
@@ -371,7 +1059,7 @@
             <a:fld id="{19F24AD4-A78B-B645-8B43-825B1EB2901C}" type="datetimeFigureOut">
               <a:rPr lang="en-US" smtClean="0"/>
               <a:pPr/>
-              <a:t>10/19/10</a:t>
+              <a:t>10/20/10</a:t>
             </a:fld>
             <a:endParaRPr lang="en-US"/>
           </a:p>
@@ -907,7 +1595,7 @@
             <a:fld id="{ADB8239A-D789-5443-937F-338E3AE3D41C}" type="datetime1">
               <a:rPr lang="en-US" smtClean="0"/>
               <a:pPr/>
-              <a:t>10/19/10</a:t>
+              <a:t>10/20/10</a:t>
             </a:fld>
             <a:endParaRPr lang="en-US"/>
           </a:p>
@@ -1211,7 +1899,7 @@
             <a:fld id="{459EC1CE-E98D-704D-AD6F-6E3323A36483}" type="datetime1">
               <a:rPr lang="en-US" smtClean="0"/>
               <a:pPr/>
-              <a:t>10/19/10</a:t>
+              <a:t>10/20/10</a:t>
             </a:fld>
             <a:endParaRPr lang="en-US"/>
           </a:p>
@@ -1487,7 +2175,7 @@
             <a:fld id="{23E692A5-8B3E-1949-B0CC-6F0593ACFA8E}" type="datetime1">
               <a:rPr lang="en-US" smtClean="0"/>
               <a:pPr/>
-              <a:t>10/19/10</a:t>
+              <a:t>10/20/10</a:t>
             </a:fld>
             <a:endParaRPr lang="en-US"/>
           </a:p>
@@ -1779,7 +2467,7 @@
             <a:fld id="{C381DA14-A3C0-9C42-96F2-BEE3D5DE963D}" type="datetime1">
               <a:rPr lang="en-US" smtClean="0"/>
               <a:pPr/>
-              <a:t>10/19/10</a:t>
+              <a:t>10/20/10</a:t>
             </a:fld>
             <a:endParaRPr lang="en-US"/>
           </a:p>
@@ -2106,7 +2794,7 @@
             <a:fld id="{33319320-9A5F-694B-B7B5-C734EC93AAA2}" type="datetime1">
               <a:rPr lang="en-US" smtClean="0"/>
               <a:pPr/>
-              <a:t>10/19/10</a:t>
+              <a:t>10/20/10</a:t>
             </a:fld>
             <a:endParaRPr lang="en-US"/>
           </a:p>
@@ -2354,7 +3042,7 @@
             <a:fld id="{CF6CE397-A6E6-7547-B24A-92BB5049E0F2}" type="datetime1">
               <a:rPr lang="en-US" smtClean="0"/>
               <a:pPr/>
-              <a:t>10/19/10</a:t>
+              <a:t>10/20/10</a:t>
             </a:fld>
             <a:endParaRPr lang="en-US"/>
           </a:p>
@@ -2531,7 +3219,7 @@
             <a:fld id="{27AB7D46-BD5E-E641-9118-DCE28F3B83FA}" type="datetime1">
               <a:rPr lang="en-US" smtClean="0"/>
               <a:pPr/>
-              <a:t>10/19/10</a:t>
+              <a:t>10/20/10</a:t>
             </a:fld>
             <a:endParaRPr lang="en-US"/>
           </a:p>
@@ -2871,7 +3559,7 @@
             <a:fld id="{4C4AD4EB-88D0-C141-9474-CCD86A78CB94}" type="datetimeFigureOut">
               <a:rPr lang="en-US" smtClean="0"/>
               <a:pPr/>
-              <a:t>10/19/10</a:t>
+              <a:t>10/20/10</a:t>
             </a:fld>
             <a:endParaRPr lang="en-US"/>
           </a:p>
@@ -3155,7 +3843,7 @@
             <a:fld id="{BC26097E-015C-3B4D-86C1-CD2AD30F0B81}" type="datetime1">
               <a:rPr lang="en-US" smtClean="0"/>
               <a:pPr/>
-              <a:t>10/19/10</a:t>
+              <a:t>10/20/10</a:t>
             </a:fld>
             <a:endParaRPr lang="en-US"/>
           </a:p>
@@ -3431,7 +4119,7 @@
             <a:fld id="{ED6649F4-2545-3040-B7BD-803CA59D50C7}" type="datetime1">
               <a:rPr lang="en-US" smtClean="0"/>
               <a:pPr/>
-              <a:t>10/19/10</a:t>
+              <a:t>10/20/10</a:t>
             </a:fld>
             <a:endParaRPr lang="en-US"/>
           </a:p>
@@ -3739,7 +4427,7 @@
             <a:fld id="{833A9088-CEDD-2F48-A9A0-611A3CC03FE9}" type="datetime1">
               <a:rPr lang="en-US" smtClean="0"/>
               <a:pPr/>
-              <a:t>10/19/10</a:t>
+              <a:t>10/20/10</a:t>
             </a:fld>
             <a:endParaRPr lang="en-US"/>
           </a:p>
@@ -4033,7 +4721,7 @@
             <a:fld id="{AED87ACF-EB3C-EA42-8610-542FB50388EB}" type="datetime1">
               <a:rPr lang="en-US" smtClean="0"/>
               <a:pPr/>
-              <a:t>10/19/10</a:t>
+              <a:t>10/20/10</a:t>
             </a:fld>
             <a:endParaRPr lang="en-US"/>
           </a:p>
@@ -4465,7 +5153,7 @@
             <a:fld id="{0E0DC31B-692F-774E-A937-DA560DE61DA8}" type="datetime1">
               <a:rPr lang="en-US" smtClean="0"/>
               <a:pPr/>
-              <a:t>10/19/10</a:t>
+              <a:t>10/20/10</a:t>
             </a:fld>
             <a:endParaRPr lang="en-US"/>
           </a:p>
@@ -4813,7 +5501,7 @@
             <a:fld id="{95DEFDAE-5BDC-1B4F-BC4C-23C867CEBC21}" type="datetime1">
               <a:rPr lang="en-US" smtClean="0"/>
               <a:pPr/>
-              <a:t>10/19/10</a:t>
+              <a:t>10/20/10</a:t>
             </a:fld>
             <a:endParaRPr lang="en-US"/>
           </a:p>
@@ -4905,7 +5593,7 @@
             <a:fld id="{9F53C516-787B-9A45-AFCF-5D75DD78DEBE}" type="datetime1">
               <a:rPr lang="en-US" smtClean="0"/>
               <a:pPr/>
-              <a:t>10/19/10</a:t>
+              <a:t>10/20/10</a:t>
             </a:fld>
             <a:endParaRPr lang="en-US"/>
           </a:p>
@@ -5244,7 +5932,7 @@
             <a:fld id="{F19CAA94-9393-BB4A-8CB6-008B1351A132}" type="datetime1">
               <a:rPr lang="en-US" smtClean="0"/>
               <a:pPr/>
-              <a:t>10/19/10</a:t>
+              <a:t>10/20/10</a:t>
             </a:fld>
             <a:endParaRPr lang="en-US"/>
           </a:p>
@@ -5458,7 +6146,7 @@
             <a:fld id="{A3476A5E-2ED6-7749-A8C1-D0B1EEEB97E0}" type="datetime1">
               <a:rPr lang="en-US" smtClean="0"/>
               <a:pPr/>
-              <a:t>10/19/10</a:t>
+              <a:t>10/20/10</a:t>
             </a:fld>
             <a:endParaRPr lang="en-US"/>
           </a:p>
@@ -6872,7 +7560,7 @@
             <a:fld id="{4C4AD4EB-88D0-C141-9474-CCD86A78CB94}" type="datetimeFigureOut">
               <a:rPr lang="en-US" smtClean="0"/>
               <a:pPr/>
-              <a:t>10/19/10</a:t>
+              <a:t>10/20/10</a:t>
             </a:fld>
             <a:endParaRPr lang="en-US"/>
           </a:p>
@@ -7452,11 +8140,7 @@
           <a:p>
             <a:r>
               <a:rPr lang="en-US" dirty="0" smtClean="0"/>
-              <a:t>A Brief Introduction to </a:t>
-            </a:r>
-            <a:r>
-              <a:rPr lang="en-US" dirty="0" smtClean="0"/>
-              <a:t>SAGA</a:t>
+              <a:t>A Brief Introduction to SAGA</a:t>
             </a:r>
             <a:endParaRPr lang="en-US" dirty="0"/>
           </a:p>
@@ -7590,6 +8274,192 @@
       </p:grpSpPr>
       <p:sp>
         <p:nvSpPr>
+          <p:cNvPr id="2" name="Title 1"/>
+          <p:cNvSpPr>
+            <a:spLocks noGrp="1"/>
+          </p:cNvSpPr>
+          <p:nvPr>
+            <p:ph type="title"/>
+          </p:nvPr>
+        </p:nvSpPr>
+        <p:spPr/>
+        <p:txBody>
+          <a:bodyPr/>
+          <a:lstStyle/>
+          <a:p>
+            <a:r>
+              <a:rPr lang="en-US" dirty="0" smtClean="0"/>
+              <a:t>Innovation in Distributed Algorithms (2)</a:t>
+            </a:r>
+            <a:endParaRPr lang="en-US" dirty="0"/>
+          </a:p>
+        </p:txBody>
+      </p:sp>
+      <p:graphicFrame>
+        <p:nvGraphicFramePr>
+          <p:cNvPr id="5" name="Chart 4"/>
+          <p:cNvGraphicFramePr/>
+          <p:nvPr/>
+        </p:nvGraphicFramePr>
+        <p:xfrm>
+          <a:off x="1094828" y="2662621"/>
+          <a:ext cx="7112000" cy="3365500"/>
+        </p:xfrm>
+        <a:graphic>
+          <a:graphicData uri="http://schemas.openxmlformats.org/drawingml/2006/chart">
+            <c:chart xmlns:c="http://schemas.openxmlformats.org/drawingml/2006/chart" xmlns:r="http://schemas.openxmlformats.org/officeDocument/2006/relationships" r:id="rId2"/>
+          </a:graphicData>
+        </a:graphic>
+      </p:graphicFrame>
+    </p:spTree>
+  </p:cSld>
+  <p:clrMapOvr>
+    <a:masterClrMapping/>
+  </p:clrMapOvr>
+</p:sld>
+</file>
+
+<file path=ppt/slides/slide11.xml><?xml version="1.0" encoding="utf-8"?>
+<p:sld xmlns:a="http://schemas.openxmlformats.org/drawingml/2006/main" xmlns:r="http://schemas.openxmlformats.org/officeDocument/2006/relationships" xmlns:mc="http://schemas.openxmlformats.org/markup-compatibility/2006" xmlns:mv="urn:schemas-microsoft-com:mac:vml" xmlns:p="http://schemas.openxmlformats.org/presentationml/2006/main" mc:Ignorable="mv" mc:PreserveAttributes="mv:*">
+  <p:cSld>
+    <p:spTree>
+      <p:nvGrpSpPr>
+        <p:cNvPr id="1" name=""/>
+        <p:cNvGrpSpPr/>
+        <p:nvPr/>
+      </p:nvGrpSpPr>
+      <p:grpSpPr>
+        <a:xfrm>
+          <a:off x="0" y="0"/>
+          <a:ext cx="0" cy="0"/>
+          <a:chOff x="0" y="0"/>
+          <a:chExt cx="0" cy="0"/>
+        </a:xfrm>
+      </p:grpSpPr>
+      <p:sp>
+        <p:nvSpPr>
+          <p:cNvPr id="2" name="Title 1"/>
+          <p:cNvSpPr>
+            <a:spLocks noGrp="1"/>
+          </p:cNvSpPr>
+          <p:nvPr>
+            <p:ph type="title"/>
+          </p:nvPr>
+        </p:nvSpPr>
+        <p:spPr/>
+        <p:txBody>
+          <a:bodyPr>
+            <a:normAutofit fontScale="90000"/>
+          </a:bodyPr>
+          <a:lstStyle/>
+          <a:p>
+            <a:r>
+              <a:rPr lang="en-US" dirty="0" smtClean="0"/>
+              <a:t>Understanding Distributed Programming Models </a:t>
+            </a:r>
+            <a:endParaRPr lang="en-US" dirty="0"/>
+          </a:p>
+        </p:txBody>
+      </p:sp>
+      <p:pic>
+        <p:nvPicPr>
+          <p:cNvPr id="4" name="Content Placeholder 3" descr="sphere_varying_workers.png"/>
+          <p:cNvPicPr>
+            <a:picLocks noGrp="1" noChangeAspect="1"/>
+          </p:cNvPicPr>
+          <p:nvPr>
+            <p:ph idx="1"/>
+          </p:nvPr>
+        </p:nvPicPr>
+        <p:blipFill>
+          <a:blip r:embed="rId2"/>
+          <a:srcRect l="-14268" r="-14268"/>
+          <a:stretch>
+            <a:fillRect/>
+          </a:stretch>
+        </p:blipFill>
+        <p:spPr>
+          <a:xfrm>
+            <a:off x="4129449" y="1817641"/>
+            <a:ext cx="5014551" cy="2731106"/>
+          </a:xfrm>
+        </p:spPr>
+      </p:pic>
+      <p:pic>
+        <p:nvPicPr>
+          <p:cNvPr id="5" name="Picture 4" descr="sagamr_varying_workers.png"/>
+          <p:cNvPicPr>
+            <a:picLocks noChangeAspect="1"/>
+          </p:cNvPicPr>
+          <p:nvPr/>
+        </p:nvPicPr>
+        <p:blipFill>
+          <a:blip r:embed="rId3"/>
+          <a:stretch>
+            <a:fillRect/>
+          </a:stretch>
+        </p:blipFill>
+        <p:spPr>
+          <a:xfrm>
+            <a:off x="4746883" y="4310826"/>
+            <a:ext cx="3827804" cy="2547174"/>
+          </a:xfrm>
+          <a:prstGeom prst="rect">
+            <a:avLst/>
+          </a:prstGeom>
+        </p:spPr>
+      </p:pic>
+      <p:pic>
+        <p:nvPicPr>
+          <p:cNvPr id="6" name="Picture 5" descr="sphere_mr_varying_chunksize.png"/>
+          <p:cNvPicPr>
+            <a:picLocks noChangeAspect="1"/>
+          </p:cNvPicPr>
+          <p:nvPr/>
+        </p:nvPicPr>
+        <p:blipFill>
+          <a:blip r:embed="rId4"/>
+          <a:stretch>
+            <a:fillRect/>
+          </a:stretch>
+        </p:blipFill>
+        <p:spPr>
+          <a:xfrm>
+            <a:off x="0" y="2465574"/>
+            <a:ext cx="4571429" cy="3200000"/>
+          </a:xfrm>
+          <a:prstGeom prst="rect">
+            <a:avLst/>
+          </a:prstGeom>
+        </p:spPr>
+      </p:pic>
+    </p:spTree>
+  </p:cSld>
+  <p:clrMapOvr>
+    <a:masterClrMapping/>
+  </p:clrMapOvr>
+</p:sld>
+</file>
+
+<file path=ppt/slides/slide12.xml><?xml version="1.0" encoding="utf-8"?>
+<p:sld xmlns:a="http://schemas.openxmlformats.org/drawingml/2006/main" xmlns:r="http://schemas.openxmlformats.org/officeDocument/2006/relationships" xmlns:mc="http://schemas.openxmlformats.org/markup-compatibility/2006" xmlns:mv="urn:schemas-microsoft-com:mac:vml" xmlns:p="http://schemas.openxmlformats.org/presentationml/2006/main" mc:Ignorable="mv" mc:PreserveAttributes="mv:*">
+  <p:cSld>
+    <p:spTree>
+      <p:nvGrpSpPr>
+        <p:cNvPr id="1" name=""/>
+        <p:cNvGrpSpPr/>
+        <p:nvPr/>
+      </p:nvGrpSpPr>
+      <p:grpSpPr>
+        <a:xfrm>
+          <a:off x="0" y="0"/>
+          <a:ext cx="0" cy="0"/>
+          <a:chOff x="0" y="0"/>
+          <a:chExt cx="0" cy="0"/>
+        </a:xfrm>
+      </p:grpSpPr>
+      <p:sp>
+        <p:nvSpPr>
           <p:cNvPr id="61" name="Footer Placeholder 3"/>
           <p:cNvSpPr>
             <a:spLocks noGrp="1"/>
@@ -7628,7 +8498,7 @@
             <a:fld id="{D7EEED34-8CD6-0C49-8D66-19FEDD51CB4E}" type="slidenum">
               <a:rPr lang="en-US"/>
               <a:pPr/>
-              <a:t>10</a:t>
+              <a:t>12</a:t>
             </a:fld>
             <a:endParaRPr lang="en-US"/>
           </a:p>
@@ -11016,7 +11886,7 @@
 </p:sld>
 </file>
 
-<file path=ppt/slides/slide11.xml><?xml version="1.0" encoding="utf-8"?>
+<file path=ppt/slides/slide13.xml><?xml version="1.0" encoding="utf-8"?>
 <p:sld xmlns:a="http://schemas.openxmlformats.org/drawingml/2006/main" xmlns:r="http://schemas.openxmlformats.org/officeDocument/2006/relationships" xmlns:mc="http://schemas.openxmlformats.org/markup-compatibility/2006" xmlns:mv="urn:schemas-microsoft-com:mac:vml" xmlns:p="http://schemas.openxmlformats.org/presentationml/2006/main" mc:Ignorable="mv" mc:PreserveAttributes="mv:*">
   <p:cSld>
     <p:spTree>
@@ -11130,7 +12000,7 @@
 </p:sld>
 </file>
 
-<file path=ppt/slides/slide2.xml><?xml version="1.0" encoding="utf-8"?>
+<file path=ppt/slides/slide14.xml><?xml version="1.0" encoding="utf-8"?>
 <p:sld xmlns:a="http://schemas.openxmlformats.org/drawingml/2006/main" xmlns:r="http://schemas.openxmlformats.org/officeDocument/2006/relationships" xmlns:mc="http://schemas.openxmlformats.org/markup-compatibility/2006" xmlns:mv="urn:schemas-microsoft-com:mac:vml" xmlns:p="http://schemas.openxmlformats.org/presentationml/2006/main" mc:Ignorable="mv" mc:PreserveAttributes="mv:*">
   <p:cSld>
     <p:spTree>
@@ -11159,12 +12029,33 @@
         </p:nvSpPr>
         <p:spPr/>
         <p:txBody>
-          <a:bodyPr/>
+          <a:bodyPr>
+            <a:normAutofit fontScale="90000"/>
+          </a:bodyPr>
           <a:lstStyle/>
           <a:p>
             <a:r>
+              <a:rPr lang="en-US" dirty="0" err="1" smtClean="0"/>
+              <a:t>ExTENCI</a:t>
+            </a:r>
+            <a:r>
               <a:rPr lang="en-US" dirty="0" smtClean="0"/>
-              <a:t>Installation</a:t>
+              <a:t>: </a:t>
+            </a:r>
+            <a:r>
+              <a:rPr lang="en-US" dirty="0" err="1" smtClean="0"/>
+              <a:t>TeraGrid</a:t>
+            </a:r>
+            <a:r>
+              <a:rPr lang="en-US" dirty="0" smtClean="0"/>
+              <a:t>-OSG [2010-12]</a:t>
+            </a:r>
+            <a:br>
+              <a:rPr lang="en-US" dirty="0" smtClean="0"/>
+            </a:br>
+            <a:r>
+              <a:rPr lang="en-US" dirty="0" smtClean="0"/>
+              <a:t>Cactus Application Scenarios</a:t>
             </a:r>
             <a:endParaRPr lang="en-US" dirty="0"/>
           </a:p>
@@ -11182,109 +12073,124 @@
         </p:nvSpPr>
         <p:spPr/>
         <p:txBody>
-          <a:bodyPr>
-            <a:normAutofit/>
-          </a:bodyPr>
+          <a:bodyPr/>
           <a:lstStyle/>
           <a:p>
             <a:r>
               <a:rPr lang="en-US" dirty="0" smtClean="0"/>
-              <a:t>SAGA consists of several components that can be installed on demand and separately:</a:t>
+              <a:t>Problem size varies – determinant of Infrastructure used</a:t>
             </a:r>
           </a:p>
           <a:p>
             <a:pPr lvl="1"/>
             <a:r>
-              <a:rPr lang="en-US" b="1" i="1" dirty="0" smtClean="0"/>
-              <a:t>Core Components </a:t>
-            </a:r>
-            <a:r>
               <a:rPr lang="en-US" dirty="0" smtClean="0"/>
-              <a:t>(required)</a:t>
-            </a:r>
-            <a:endParaRPr lang="en-US" b="1" i="1" dirty="0" smtClean="0"/>
+              <a:t>TG, OSG or either..</a:t>
+            </a:r>
+          </a:p>
+          <a:p>
+            <a:r>
+              <a:rPr lang="en-US" dirty="0" smtClean="0"/>
+              <a:t>MPI-based applications have a very complex SW environment that they need to worry about</a:t>
+            </a:r>
+          </a:p>
+          <a:p>
+            <a:r>
+              <a:rPr lang="en-US" dirty="0" smtClean="0"/>
+              <a:t>Application Scenarios/Usage Modes</a:t>
+            </a:r>
+          </a:p>
+          <a:p>
+            <a:pPr lvl="1"/>
+            <a:r>
+              <a:rPr lang="en-US" dirty="0" smtClean="0"/>
+              <a:t>1. Ensemble of Cactus Simulations</a:t>
+            </a:r>
           </a:p>
           <a:p>
             <a:pPr lvl="2"/>
             <a:r>
+              <a:rPr lang="en-US" dirty="0" err="1" smtClean="0"/>
+              <a:t>NumRel</a:t>
+            </a:r>
+            <a:r>
               <a:rPr lang="en-US" dirty="0" smtClean="0"/>
-              <a:t>Also contains the default adaptors (local files, local jobs </a:t>
-            </a:r>
-            <a:br>
+              <a:t>, </a:t>
+            </a:r>
+            <a:r>
+              <a:rPr lang="en-US" dirty="0" err="1" smtClean="0"/>
+              <a:t>EnKF</a:t>
+            </a:r>
+            <a:r>
               <a:rPr lang="en-US" dirty="0" smtClean="0"/>
-            </a:br>
+              <a:t> (Petroleum Eng)</a:t>
+            </a:r>
+          </a:p>
+          <a:p>
+            <a:pPr lvl="1"/>
             <a:r>
               <a:rPr lang="en-US" dirty="0" smtClean="0"/>
-              <a:t>and SQL-based advert and replica adaptors) </a:t>
+              <a:t>2. </a:t>
+            </a:r>
+            <a:r>
+              <a:rPr lang="en-US" dirty="0" err="1" smtClean="0"/>
+              <a:t>Multiphysics</a:t>
+            </a:r>
+            <a:r>
+              <a:rPr lang="en-US" dirty="0" smtClean="0"/>
+              <a:t> Code</a:t>
+            </a:r>
+          </a:p>
+          <a:p>
+            <a:pPr lvl="2"/>
+            <a:r>
+              <a:rPr lang="en-US" dirty="0" smtClean="0"/>
+              <a:t>GR-MHD, CFD-MD</a:t>
             </a:r>
           </a:p>
           <a:p>
             <a:pPr lvl="1"/>
             <a:r>
-              <a:rPr lang="en-US" b="1" i="1" dirty="0" smtClean="0"/>
-              <a:t>Python Language Bindings </a:t>
-            </a:r>
-            <a:r>
               <a:rPr lang="en-US" dirty="0" smtClean="0"/>
-              <a:t>(optional)</a:t>
-            </a:r>
+              <a:t>3. Spawning Simulations</a:t>
+            </a:r>
+          </a:p>
+          <a:p>
+            <a:pPr lvl="2"/>
+            <a:r>
+              <a:rPr lang="en-US" dirty="0" err="1" smtClean="0"/>
+              <a:t>Realtime</a:t>
+            </a:r>
+            <a:r>
+              <a:rPr lang="en-US" dirty="0" smtClean="0"/>
+              <a:t> ‘outsourcing’ from </a:t>
+            </a:r>
+            <a:r>
+              <a:rPr lang="en-US" dirty="0" err="1" smtClean="0"/>
+              <a:t>BlueWaters</a:t>
+            </a:r>
+            <a:r>
+              <a:rPr lang="en-US" dirty="0" smtClean="0"/>
+              <a:t>/Ranger to </a:t>
+            </a:r>
+            <a:r>
+              <a:rPr lang="en-US" dirty="0" err="1" smtClean="0"/>
+              <a:t>specialised</a:t>
+            </a:r>
+            <a:r>
+              <a:rPr lang="en-US" dirty="0" smtClean="0"/>
+              <a:t> architectures or less powerful resources</a:t>
+            </a:r>
+          </a:p>
+          <a:p>
+            <a:endParaRPr lang="en-US" dirty="0" smtClean="0"/>
+          </a:p>
+          <a:p>
+            <a:endParaRPr lang="en-US" dirty="0" smtClean="0"/>
           </a:p>
           <a:p>
             <a:pPr lvl="1"/>
-            <a:r>
-              <a:rPr lang="en-US" b="1" i="1" dirty="0" smtClean="0"/>
-              <a:t>Adaptors </a:t>
-            </a:r>
-            <a:r>
-              <a:rPr lang="en-US" dirty="0" smtClean="0"/>
-              <a:t>(optional)</a:t>
-            </a:r>
-            <a:endParaRPr lang="en-US" b="1" i="1" dirty="0" smtClean="0"/>
-          </a:p>
-          <a:p>
-            <a:pPr lvl="2"/>
-            <a:r>
-              <a:rPr lang="en-US" dirty="0" err="1" smtClean="0"/>
-              <a:t>Globus</a:t>
-            </a:r>
-            <a:r>
-              <a:rPr lang="en-US" dirty="0" smtClean="0"/>
-              <a:t>, LSF, </a:t>
-            </a:r>
-            <a:r>
-              <a:rPr lang="en-US" dirty="0" err="1" smtClean="0"/>
-              <a:t>gLite</a:t>
-            </a:r>
-            <a:r>
-              <a:rPr lang="en-US" dirty="0" smtClean="0"/>
-              <a:t>, SSH, Cloud, …</a:t>
-            </a:r>
-          </a:p>
-          <a:p>
-            <a:r>
-              <a:rPr lang="en-US" dirty="0" smtClean="0"/>
-              <a:t>The latest versions of all components can be downloaded from the SAGA website: </a:t>
-            </a:r>
-            <a:r>
-              <a:rPr lang="en-US" dirty="0" smtClean="0">
-                <a:hlinkClick r:id="rId2"/>
-              </a:rPr>
-              <a:t>http://saga.cct.lsu.edu/</a:t>
-            </a:r>
-            <a:endParaRPr lang="en-US" dirty="0" smtClean="0"/>
-          </a:p>
-          <a:p>
-            <a:r>
-              <a:rPr lang="en-US" dirty="0" smtClean="0"/>
-              <a:t>SVN: </a:t>
-            </a:r>
-            <a:r>
-              <a:rPr lang="en-US" dirty="0" smtClean="0">
-                <a:hlinkClick r:id="rId3"/>
-              </a:rPr>
-              <a:t>https://svn.cct.lsu.edu/repos/saga/</a:t>
-            </a:r>
-            <a:endParaRPr lang="en-US" dirty="0" smtClean="0"/>
+            <a:endParaRPr lang="en-US" dirty="0"/>
           </a:p>
         </p:txBody>
       </p:sp>
@@ -11293,10 +12199,107 @@
   <p:clrMapOvr>
     <a:masterClrMapping/>
   </p:clrMapOvr>
+  <p:timing>
+    <p:tnLst>
+      <p:par>
+        <p:cTn id="1" dur="indefinite" restart="never" nodeType="tmRoot"/>
+      </p:par>
+    </p:tnLst>
+  </p:timing>
 </p:sld>
 </file>
 
-<file path=ppt/slides/slide3.xml><?xml version="1.0" encoding="utf-8"?>
+<file path=ppt/slides/slide15.xml><?xml version="1.0" encoding="utf-8"?>
+<p:sld xmlns:a="http://schemas.openxmlformats.org/drawingml/2006/main" xmlns:r="http://schemas.openxmlformats.org/officeDocument/2006/relationships" xmlns:mc="http://schemas.openxmlformats.org/markup-compatibility/2006" xmlns:mv="urn:schemas-microsoft-com:mac:vml" xmlns:p="http://schemas.openxmlformats.org/presentationml/2006/main" mc:Ignorable="mv" mc:PreserveAttributes="mv:*">
+  <p:cSld>
+    <p:spTree>
+      <p:nvGrpSpPr>
+        <p:cNvPr id="1" name=""/>
+        <p:cNvGrpSpPr/>
+        <p:nvPr/>
+      </p:nvGrpSpPr>
+      <p:grpSpPr>
+        <a:xfrm>
+          <a:off x="0" y="0"/>
+          <a:ext cx="0" cy="0"/>
+          <a:chOff x="0" y="0"/>
+          <a:chExt cx="0" cy="0"/>
+        </a:xfrm>
+      </p:grpSpPr>
+      <p:pic>
+        <p:nvPicPr>
+          <p:cNvPr id="87042" name="Picture 1" descr="Picture 2.png"/>
+          <p:cNvPicPr>
+            <a:picLocks noChangeAspect="1"/>
+          </p:cNvPicPr>
+          <p:nvPr/>
+        </p:nvPicPr>
+        <p:blipFill>
+          <a:blip r:embed="rId2"/>
+          <a:srcRect/>
+          <a:stretch>
+            <a:fillRect/>
+          </a:stretch>
+        </p:blipFill>
+        <p:spPr bwMode="auto">
+          <a:xfrm>
+            <a:off x="192088" y="1016000"/>
+            <a:ext cx="8799512" cy="5232400"/>
+          </a:xfrm>
+          <a:prstGeom prst="rect">
+            <a:avLst/>
+          </a:prstGeom>
+          <a:noFill/>
+          <a:ln w="9525">
+            <a:noFill/>
+            <a:miter lim="800000"/>
+            <a:headEnd/>
+            <a:tailEnd/>
+          </a:ln>
+        </p:spPr>
+      </p:pic>
+      <p:sp>
+        <p:nvSpPr>
+          <p:cNvPr id="5" name="Title 4"/>
+          <p:cNvSpPr>
+            <a:spLocks noGrp="1"/>
+          </p:cNvSpPr>
+          <p:nvPr>
+            <p:ph type="title"/>
+          </p:nvPr>
+        </p:nvSpPr>
+        <p:spPr/>
+        <p:txBody>
+          <a:bodyPr>
+            <a:normAutofit fontScale="90000"/>
+          </a:bodyPr>
+          <a:lstStyle/>
+          <a:p>
+            <a:r>
+              <a:rPr lang="en-US" dirty="0" smtClean="0"/>
+              <a:t>SAGA – Production Grade Software supporting fundamental research </a:t>
+            </a:r>
+            <a:endParaRPr lang="en-US" dirty="0"/>
+          </a:p>
+        </p:txBody>
+      </p:sp>
+    </p:spTree>
+  </p:cSld>
+  <p:clrMapOvr>
+    <a:masterClrMapping/>
+  </p:clrMapOvr>
+  <p:transition/>
+  <p:timing>
+    <p:tnLst>
+      <p:par>
+        <p:cTn id="1" dur="indefinite" restart="never" nodeType="tmRoot"/>
+      </p:par>
+    </p:tnLst>
+  </p:timing>
+</p:sld>
+</file>
+
+<file path=ppt/slides/slide2.xml><?xml version="1.0" encoding="utf-8"?>
 <p:sld xmlns:a="http://schemas.openxmlformats.org/drawingml/2006/main" xmlns:r="http://schemas.openxmlformats.org/officeDocument/2006/relationships" xmlns:mc="http://schemas.openxmlformats.org/markup-compatibility/2006" xmlns:mv="urn:schemas-microsoft-com:mac:vml" xmlns:p="http://schemas.openxmlformats.org/presentationml/2006/main" mc:Ignorable="mv" mc:PreserveAttributes="mv:*">
   <p:cSld>
     <p:spTree>
@@ -11601,7 +12604,7 @@
 </p:sld>
 </file>
 
-<file path=ppt/slides/slide4.xml><?xml version="1.0" encoding="utf-8"?>
+<file path=ppt/slides/slide3.xml><?xml version="1.0" encoding="utf-8"?>
 <p:sld xmlns:a="http://schemas.openxmlformats.org/drawingml/2006/main" xmlns:r="http://schemas.openxmlformats.org/officeDocument/2006/relationships" xmlns:mc="http://schemas.openxmlformats.org/markup-compatibility/2006" xmlns:mv="urn:schemas-microsoft-com:mac:vml" xmlns:p="http://schemas.openxmlformats.org/presentationml/2006/main" mc:Ignorable="mv" mc:PreserveAttributes="mv:*">
   <p:cSld>
     <p:spTree>
@@ -12271,7 +13274,7 @@
 </p:sld>
 </file>
 
-<file path=ppt/slides/slide5.xml><?xml version="1.0" encoding="utf-8"?>
+<file path=ppt/slides/slide4.xml><?xml version="1.0" encoding="utf-8"?>
 <p:sld xmlns:a="http://schemas.openxmlformats.org/drawingml/2006/main" xmlns:r="http://schemas.openxmlformats.org/officeDocument/2006/relationships" xmlns:mc="http://schemas.openxmlformats.org/markup-compatibility/2006" xmlns:mv="urn:schemas-microsoft-com:mac:vml" xmlns:p="http://schemas.openxmlformats.org/presentationml/2006/main" mc:Ignorable="mv" mc:PreserveAttributes="mv:*">
   <p:cSld>
     <p:spTree>
@@ -12358,7 +13361,7 @@
 </p:sld>
 </file>
 
-<file path=ppt/slides/slide6.xml><?xml version="1.0" encoding="utf-8"?>
+<file path=ppt/slides/slide5.xml><?xml version="1.0" encoding="utf-8"?>
 <p:sld xmlns:a="http://schemas.openxmlformats.org/drawingml/2006/main" xmlns:r="http://schemas.openxmlformats.org/officeDocument/2006/relationships" xmlns:mc="http://schemas.openxmlformats.org/markup-compatibility/2006" xmlns:mv="urn:schemas-microsoft-com:mac:vml" xmlns:p="http://schemas.openxmlformats.org/presentationml/2006/main" mc:Ignorable="mv" mc:PreserveAttributes="mv:*">
   <p:cSld>
     <p:spTree>
@@ -12423,6 +13426,97 @@
     <a:masterClrMapping/>
   </p:clrMapOvr>
   <p:transition/>
+  <p:timing>
+    <p:tnLst>
+      <p:par>
+        <p:cTn id="1" dur="indefinite" restart="never" nodeType="tmRoot"/>
+      </p:par>
+    </p:tnLst>
+  </p:timing>
+</p:sld>
+</file>
+
+<file path=ppt/slides/slide6.xml><?xml version="1.0" encoding="utf-8"?>
+<p:sld xmlns:a="http://schemas.openxmlformats.org/drawingml/2006/main" xmlns:r="http://schemas.openxmlformats.org/officeDocument/2006/relationships" xmlns:mc="http://schemas.openxmlformats.org/markup-compatibility/2006" xmlns:mv="urn:schemas-microsoft-com:mac:vml" xmlns:p="http://schemas.openxmlformats.org/presentationml/2006/main" mc:Ignorable="mv" mc:PreserveAttributes="mv:*">
+  <p:cSld>
+    <p:spTree>
+      <p:nvGrpSpPr>
+        <p:cNvPr id="1" name=""/>
+        <p:cNvGrpSpPr/>
+        <p:nvPr/>
+      </p:nvGrpSpPr>
+      <p:grpSpPr>
+        <a:xfrm>
+          <a:off x="0" y="0"/>
+          <a:ext cx="0" cy="0"/>
+          <a:chOff x="0" y="0"/>
+          <a:chExt cx="0" cy="0"/>
+        </a:xfrm>
+      </p:grpSpPr>
+      <p:sp>
+        <p:nvSpPr>
+          <p:cNvPr id="2" name="Title 1"/>
+          <p:cNvSpPr>
+            <a:spLocks noGrp="1"/>
+          </p:cNvSpPr>
+          <p:nvPr>
+            <p:ph type="title"/>
+          </p:nvPr>
+        </p:nvSpPr>
+        <p:spPr/>
+        <p:txBody>
+          <a:bodyPr>
+            <a:noAutofit/>
+          </a:bodyPr>
+          <a:lstStyle/>
+          <a:p>
+            <a:r>
+              <a:rPr lang="en-US" sz="2600" dirty="0" smtClean="0"/>
+              <a:t>Abstractions for Dynamic Execution (2)</a:t>
+            </a:r>
+            <a:br>
+              <a:rPr lang="en-US" sz="2600" dirty="0" smtClean="0"/>
+            </a:br>
+            <a:r>
+              <a:rPr lang="en-US" sz="2600" dirty="0" smtClean="0"/>
+              <a:t>SAGA Pilot-Job (</a:t>
+            </a:r>
+            <a:r>
+              <a:rPr lang="en-US" sz="2600" dirty="0" err="1" smtClean="0"/>
+              <a:t>BigJob</a:t>
+            </a:r>
+            <a:r>
+              <a:rPr lang="en-US" sz="2600" dirty="0" smtClean="0"/>
+              <a:t>)</a:t>
+            </a:r>
+            <a:endParaRPr lang="en-US" sz="2600" dirty="0"/>
+          </a:p>
+        </p:txBody>
+      </p:sp>
+      <p:pic>
+        <p:nvPicPr>
+          <p:cNvPr id="4" name="Content Placeholder 3" descr="bigjob.png"/>
+          <p:cNvPicPr>
+            <a:picLocks noGrp="1" noChangeAspect="1"/>
+          </p:cNvPicPr>
+          <p:nvPr>
+            <p:ph idx="1"/>
+          </p:nvPr>
+        </p:nvPicPr>
+        <p:blipFill>
+          <a:blip r:embed="rId2"/>
+          <a:srcRect l="-2356" r="-2356"/>
+          <a:stretch>
+            <a:fillRect/>
+          </a:stretch>
+        </p:blipFill>
+        <p:spPr/>
+      </p:pic>
+    </p:spTree>
+  </p:cSld>
+  <p:clrMapOvr>
+    <a:masterClrMapping/>
+  </p:clrMapOvr>
   <p:timing>
     <p:tnLst>
       <p:par>
@@ -12822,41 +13916,9 @@
           <a:chExt cx="0" cy="0"/>
         </a:xfrm>
       </p:grpSpPr>
-      <p:pic>
-        <p:nvPicPr>
-          <p:cNvPr id="87042" name="Picture 1" descr="Picture 2.png"/>
-          <p:cNvPicPr>
-            <a:picLocks noChangeAspect="1"/>
-          </p:cNvPicPr>
-          <p:nvPr/>
-        </p:nvPicPr>
-        <p:blipFill>
-          <a:blip r:embed="rId2"/>
-          <a:srcRect/>
-          <a:stretch>
-            <a:fillRect/>
-          </a:stretch>
-        </p:blipFill>
-        <p:spPr bwMode="auto">
-          <a:xfrm>
-            <a:off x="192088" y="1016000"/>
-            <a:ext cx="8799512" cy="5232400"/>
-          </a:xfrm>
-          <a:prstGeom prst="rect">
-            <a:avLst/>
-          </a:prstGeom>
-          <a:noFill/>
-          <a:ln w="9525">
-            <a:noFill/>
-            <a:miter lim="800000"/>
-            <a:headEnd/>
-            <a:tailEnd/>
-          </a:ln>
-        </p:spPr>
-      </p:pic>
-      <p:sp>
-        <p:nvSpPr>
-          <p:cNvPr id="5" name="Title 4"/>
+      <p:sp>
+        <p:nvSpPr>
+          <p:cNvPr id="2" name="Title 1"/>
           <p:cNvSpPr>
             <a:spLocks noGrp="1"/>
           </p:cNvSpPr>
@@ -12866,32 +13928,38 @@
         </p:nvSpPr>
         <p:spPr/>
         <p:txBody>
-          <a:bodyPr>
-            <a:normAutofit fontScale="90000"/>
-          </a:bodyPr>
+          <a:bodyPr/>
           <a:lstStyle/>
           <a:p>
             <a:r>
               <a:rPr lang="en-US" dirty="0" smtClean="0"/>
-              <a:t>SAGA – Production Grade Software supporting fundamental research </a:t>
+              <a:t>Innovation in Distributed Algorithms (1)</a:t>
             </a:r>
             <a:endParaRPr lang="en-US" dirty="0"/>
           </a:p>
         </p:txBody>
       </p:sp>
+      <p:graphicFrame>
+        <p:nvGraphicFramePr>
+          <p:cNvPr id="4" name="Chart 3"/>
+          <p:cNvGraphicFramePr/>
+          <p:nvPr/>
+        </p:nvGraphicFramePr>
+        <p:xfrm>
+          <a:off x="1022350" y="2071851"/>
+          <a:ext cx="7184478" cy="3717597"/>
+        </p:xfrm>
+        <a:graphic>
+          <a:graphicData uri="http://schemas.openxmlformats.org/drawingml/2006/chart">
+            <c:chart xmlns:c="http://schemas.openxmlformats.org/drawingml/2006/chart" xmlns:r="http://schemas.openxmlformats.org/officeDocument/2006/relationships" r:id="rId2"/>
+          </a:graphicData>
+        </a:graphic>
+      </p:graphicFrame>
     </p:spTree>
   </p:cSld>
   <p:clrMapOvr>
     <a:masterClrMapping/>
   </p:clrMapOvr>
-  <p:transition/>
-  <p:timing>
-    <p:tnLst>
-      <p:par>
-        <p:cTn id="1" dur="indefinite" restart="never" nodeType="tmRoot"/>
-      </p:par>
-    </p:tnLst>
-  </p:timing>
 </p:sld>
 </file>
 

</xml_diff>

<commit_message>
final v for today..
git-svn-id: file://localhost/tmp/svn2git/svn@3102 defb5e50-622e-49ec-a68e-d72c7db87b45
</commit_message>
<xml_diff>
--- a/tutorial/general_tutorial/SAGA-Intro-Conclusion.pptx
+++ b/tutorial/general_tutorial/SAGA-Intro-Conclusion.pptx
@@ -12434,7 +12434,7 @@
         </p:nvSpPr>
         <p:spPr>
           <a:xfrm>
-            <a:off x="757947" y="1529880"/>
+            <a:off x="482366" y="2087422"/>
             <a:ext cx="7966954" cy="4940436"/>
           </a:xfrm>
         </p:spPr>
@@ -12718,8 +12718,8 @@
         </p:nvSpPr>
         <p:spPr>
           <a:xfrm>
-            <a:off x="757947" y="1529880"/>
-            <a:ext cx="7966954" cy="5033310"/>
+            <a:off x="757947" y="2038256"/>
+            <a:ext cx="7691373" cy="4524934"/>
           </a:xfrm>
           <a:prstGeom prst="rect">
             <a:avLst/>
@@ -12727,7 +12727,7 @@
         </p:spPr>
         <p:txBody>
           <a:bodyPr vert="horz" lIns="91440" tIns="45720" rIns="91440" bIns="45720" rtlCol="0">
-            <a:normAutofit fontScale="92500" lnSpcReduction="20000"/>
+            <a:normAutofit fontScale="85000" lnSpcReduction="10000"/>
           </a:bodyPr>
           <a:lstStyle/>
           <a:p>
@@ -13696,12 +13696,14 @@
         </p:nvSpPr>
         <p:spPr>
           <a:xfrm>
-            <a:off x="655077" y="1348072"/>
-            <a:ext cx="3775170" cy="4804652"/>
+            <a:off x="892711" y="2011972"/>
+            <a:ext cx="3537536" cy="4140751"/>
           </a:xfrm>
         </p:spPr>
         <p:txBody>
-          <a:bodyPr/>
+          <a:bodyPr>
+            <a:normAutofit fontScale="92500" lnSpcReduction="10000"/>
+          </a:bodyPr>
           <a:lstStyle/>
           <a:p>
             <a:r>
@@ -13838,7 +13840,7 @@
         </p:nvSpPr>
         <p:spPr>
           <a:xfrm>
-            <a:off x="713660" y="5730876"/>
+            <a:off x="713660" y="6152722"/>
             <a:ext cx="4110306" cy="923330"/>
           </a:xfrm>
           <a:prstGeom prst="rect">

</xml_diff>

<commit_message>
Adding LONI/TeraGrid Training URL where all material can be found
git-svn-id: file://localhost/tmp/svn2git/svn@3251 defb5e50-622e-49ec-a68e-d72c7db87b45
</commit_message>
<xml_diff>
--- a/tutorial/general_tutorial/SAGA-Intro-Conclusion.pptx
+++ b/tutorial/general_tutorial/SAGA-Intro-Conclusion.pptx
@@ -10,27 +10,28 @@
     <p:sldMasterId id="2147483684" r:id="rId6"/>
   </p:sldMasterIdLst>
   <p:notesMasterIdLst>
-    <p:notesMasterId r:id="rId22"/>
+    <p:notesMasterId r:id="rId23"/>
   </p:notesMasterIdLst>
   <p:handoutMasterIdLst>
-    <p:handoutMasterId r:id="rId23"/>
+    <p:handoutMasterId r:id="rId24"/>
   </p:handoutMasterIdLst>
   <p:sldIdLst>
     <p:sldId id="256" r:id="rId7"/>
-    <p:sldId id="261" r:id="rId8"/>
-    <p:sldId id="262" r:id="rId9"/>
-    <p:sldId id="263" r:id="rId10"/>
-    <p:sldId id="264" r:id="rId11"/>
-    <p:sldId id="277" r:id="rId12"/>
-    <p:sldId id="279" r:id="rId13"/>
-    <p:sldId id="272" r:id="rId14"/>
-    <p:sldId id="266" r:id="rId15"/>
-    <p:sldId id="265" r:id="rId16"/>
-    <p:sldId id="267" r:id="rId17"/>
-    <p:sldId id="278" r:id="rId18"/>
-    <p:sldId id="269" r:id="rId19"/>
-    <p:sldId id="268" r:id="rId20"/>
-    <p:sldId id="280" r:id="rId21"/>
+    <p:sldId id="281" r:id="rId8"/>
+    <p:sldId id="261" r:id="rId9"/>
+    <p:sldId id="262" r:id="rId10"/>
+    <p:sldId id="263" r:id="rId11"/>
+    <p:sldId id="264" r:id="rId12"/>
+    <p:sldId id="277" r:id="rId13"/>
+    <p:sldId id="279" r:id="rId14"/>
+    <p:sldId id="272" r:id="rId15"/>
+    <p:sldId id="266" r:id="rId16"/>
+    <p:sldId id="265" r:id="rId17"/>
+    <p:sldId id="267" r:id="rId18"/>
+    <p:sldId id="278" r:id="rId19"/>
+    <p:sldId id="269" r:id="rId20"/>
+    <p:sldId id="268" r:id="rId21"/>
+    <p:sldId id="280" r:id="rId22"/>
   </p:sldIdLst>
   <p:sldSz cx="9144000" cy="6858000" type="screen4x3"/>
   <p:notesSz cx="6858000" cy="9144000"/>
@@ -353,24 +354,24 @@
             </c:numRef>
           </c:val>
         </c:ser>
-        <c:axId val="522861096"/>
-        <c:axId val="522812888"/>
+        <c:axId val="631959640"/>
+        <c:axId val="632163016"/>
       </c:barChart>
       <c:catAx>
-        <c:axId val="522861096"/>
+        <c:axId val="631959640"/>
         <c:scaling>
           <c:orientation val="minMax"/>
         </c:scaling>
         <c:axPos val="b"/>
         <c:tickLblPos val="nextTo"/>
-        <c:crossAx val="522812888"/>
+        <c:crossAx val="632163016"/>
         <c:crosses val="autoZero"/>
         <c:auto val="1"/>
         <c:lblAlgn val="ctr"/>
         <c:lblOffset val="100"/>
       </c:catAx>
       <c:valAx>
-        <c:axId val="522812888"/>
+        <c:axId val="632163016"/>
         <c:scaling>
           <c:orientation val="minMax"/>
         </c:scaling>
@@ -378,14 +379,13 @@
         <c:majorGridlines/>
         <c:numFmt formatCode="General" sourceLinked="1"/>
         <c:tickLblPos val="nextTo"/>
-        <c:crossAx val="522861096"/>
+        <c:crossAx val="631959640"/>
         <c:crosses val="autoZero"/>
         <c:crossBetween val="between"/>
       </c:valAx>
     </c:plotArea>
     <c:legend>
       <c:legendPos val="r"/>
-      <c:layout/>
     </c:legend>
     <c:plotVisOnly val="1"/>
   </c:chart>
@@ -10271,6 +10271,208 @@
         </p:nvSpPr>
         <p:spPr/>
         <p:txBody>
+          <a:bodyPr rtlCol="0">
+            <a:normAutofit/>
+          </a:bodyPr>
+          <a:lstStyle/>
+          <a:p>
+            <a:pPr eaLnBrk="1" fontAlgn="auto" hangingPunct="1">
+              <a:spcAft>
+                <a:spcPts val="0"/>
+              </a:spcAft>
+              <a:defRPr/>
+            </a:pPr>
+            <a:r>
+              <a:rPr lang="en-US" sz="2222" dirty="0" smtClean="0"/>
+              <a:t>Distributed Adaptive Replica Exchange (DARE)</a:t>
+            </a:r>
+            <a:r>
+              <a:rPr lang="en-US" sz="2800" dirty="0" smtClean="0"/>
+              <a:t/>
+            </a:r>
+            <a:br>
+              <a:rPr lang="en-US" sz="2800" dirty="0" smtClean="0"/>
+            </a:br>
+            <a:r>
+              <a:rPr lang="en-US" sz="2222" dirty="0" smtClean="0">
+                <a:solidFill>
+                  <a:schemeClr val="bg1">
+                    <a:lumMod val="75000"/>
+                  </a:schemeClr>
+                </a:solidFill>
+              </a:rPr>
+              <a:t>Multiple Pilot-Jobs on the “Distributed” </a:t>
+            </a:r>
+            <a:r>
+              <a:rPr lang="en-US" sz="2222" dirty="0" err="1" smtClean="0">
+                <a:solidFill>
+                  <a:schemeClr val="bg1">
+                    <a:lumMod val="75000"/>
+                  </a:schemeClr>
+                </a:solidFill>
+              </a:rPr>
+              <a:t>TeraGrid</a:t>
+            </a:r>
+            <a:endParaRPr lang="en-US" sz="2222" dirty="0" smtClean="0">
+              <a:solidFill>
+                <a:srgbClr val="800000"/>
+              </a:solidFill>
+              <a:latin typeface="Cooper Black"/>
+              <a:cs typeface="Cooper Black"/>
+            </a:endParaRPr>
+          </a:p>
+        </p:txBody>
+      </p:sp>
+      <p:sp>
+        <p:nvSpPr>
+          <p:cNvPr id="8" name="Content Placeholder 7"/>
+          <p:cNvSpPr>
+            <a:spLocks noGrp="1"/>
+          </p:cNvSpPr>
+          <p:nvPr>
+            <p:ph idx="1"/>
+          </p:nvPr>
+        </p:nvSpPr>
+        <p:spPr>
+          <a:xfrm>
+            <a:off x="892710" y="2011973"/>
+            <a:ext cx="7489289" cy="1366228"/>
+          </a:xfrm>
+        </p:spPr>
+        <p:txBody>
+          <a:bodyPr>
+            <a:normAutofit/>
+          </a:bodyPr>
+          <a:lstStyle/>
+          <a:p>
+            <a:r>
+              <a:rPr lang="en-US" dirty="0" smtClean="0"/>
+              <a:t>Ability to dynamically add HPC resources. On TG:</a:t>
+            </a:r>
+          </a:p>
+          <a:p>
+            <a:r>
+              <a:rPr lang="en-US" dirty="0" smtClean="0"/>
+              <a:t>Innovations in Distributed Algorithms:</a:t>
+            </a:r>
+          </a:p>
+          <a:p>
+            <a:pPr lvl="1"/>
+            <a:r>
+              <a:rPr lang="en-US" dirty="0" smtClean="0"/>
+              <a:t>Variants of  RE: Sync (local) </a:t>
+            </a:r>
+            <a:r>
+              <a:rPr lang="en-US" dirty="0" err="1" smtClean="0"/>
+              <a:t>vs</a:t>
+            </a:r>
+            <a:r>
+              <a:rPr lang="en-US" dirty="0" smtClean="0"/>
+              <a:t> </a:t>
+            </a:r>
+            <a:r>
+              <a:rPr lang="en-US" dirty="0" err="1" smtClean="0"/>
+              <a:t>async</a:t>
+            </a:r>
+            <a:r>
+              <a:rPr lang="en-US" dirty="0" smtClean="0"/>
+              <a:t> (distr.)</a:t>
+            </a:r>
+          </a:p>
+        </p:txBody>
+      </p:sp>
+      <p:pic>
+        <p:nvPicPr>
+          <p:cNvPr id="37894" name="Picture 7" descr="perf_distributed_number_replica-1.pdf"/>
+          <p:cNvPicPr>
+            <a:picLocks noChangeAspect="1"/>
+          </p:cNvPicPr>
+          <p:nvPr/>
+        </p:nvPicPr>
+        <p:blipFill>
+          <a:blip r:embed="rId2"/>
+          <a:srcRect/>
+          <a:stretch>
+            <a:fillRect/>
+          </a:stretch>
+        </p:blipFill>
+        <p:spPr bwMode="auto">
+          <a:xfrm>
+            <a:off x="626011" y="3746500"/>
+            <a:ext cx="3657600" cy="2552700"/>
+          </a:xfrm>
+          <a:prstGeom prst="rect">
+            <a:avLst/>
+          </a:prstGeom>
+          <a:noFill/>
+          <a:ln w="9525">
+            <a:noFill/>
+            <a:miter lim="800000"/>
+            <a:headEnd/>
+            <a:tailEnd/>
+          </a:ln>
+        </p:spPr>
+      </p:pic>
+      <p:graphicFrame>
+        <p:nvGraphicFramePr>
+          <p:cNvPr id="7" name="Chart 6"/>
+          <p:cNvGraphicFramePr/>
+          <p:nvPr/>
+        </p:nvGraphicFramePr>
+        <p:xfrm>
+          <a:off x="4888046" y="3644900"/>
+          <a:ext cx="3935959" cy="3073400"/>
+        </p:xfrm>
+        <a:graphic>
+          <a:graphicData uri="http://schemas.openxmlformats.org/drawingml/2006/chart">
+            <c:chart xmlns:c="http://schemas.openxmlformats.org/drawingml/2006/chart" xmlns:r="http://schemas.openxmlformats.org/officeDocument/2006/relationships" r:id="rId3"/>
+          </a:graphicData>
+        </a:graphic>
+      </p:graphicFrame>
+    </p:spTree>
+  </p:cSld>
+  <p:clrMapOvr>
+    <a:masterClrMapping/>
+  </p:clrMapOvr>
+  <p:timing>
+    <p:tnLst>
+      <p:par>
+        <p:cTn id="1" dur="indefinite" restart="never" nodeType="tmRoot"/>
+      </p:par>
+    </p:tnLst>
+  </p:timing>
+</p:sld>
+</file>
+
+<file path=ppt/slides/slide11.xml><?xml version="1.0" encoding="utf-8"?>
+<p:sld xmlns:a="http://schemas.openxmlformats.org/drawingml/2006/main" xmlns:r="http://schemas.openxmlformats.org/officeDocument/2006/relationships" xmlns:mc="http://schemas.openxmlformats.org/markup-compatibility/2006" xmlns:mv="urn:schemas-microsoft-com:mac:vml" xmlns:p="http://schemas.openxmlformats.org/presentationml/2006/main" mc:Ignorable="mv" mc:PreserveAttributes="mv:*">
+  <p:cSld>
+    <p:spTree>
+      <p:nvGrpSpPr>
+        <p:cNvPr id="1" name=""/>
+        <p:cNvGrpSpPr/>
+        <p:nvPr/>
+      </p:nvGrpSpPr>
+      <p:grpSpPr>
+        <a:xfrm>
+          <a:off x="0" y="0"/>
+          <a:ext cx="0" cy="0"/>
+          <a:chOff x="0" y="0"/>
+          <a:chExt cx="0" cy="0"/>
+        </a:xfrm>
+      </p:grpSpPr>
+      <p:sp>
+        <p:nvSpPr>
+          <p:cNvPr id="2" name="Title 1"/>
+          <p:cNvSpPr>
+            <a:spLocks noGrp="1"/>
+          </p:cNvSpPr>
+          <p:nvPr>
+            <p:ph type="title"/>
+          </p:nvPr>
+        </p:nvSpPr>
+        <p:spPr/>
+        <p:txBody>
           <a:bodyPr>
             <a:noAutofit/>
           </a:bodyPr>
@@ -10318,7 +10520,7 @@
 </p:sld>
 </file>
 
-<file path=ppt/slides/slide11.xml><?xml version="1.0" encoding="utf-8"?>
+<file path=ppt/slides/slide12.xml><?xml version="1.0" encoding="utf-8"?>
 <p:sld xmlns:a="http://schemas.openxmlformats.org/drawingml/2006/main" xmlns:r="http://schemas.openxmlformats.org/officeDocument/2006/relationships" xmlns:mc="http://schemas.openxmlformats.org/markup-compatibility/2006" xmlns:mv="urn:schemas-microsoft-com:mac:vml" xmlns:p="http://schemas.openxmlformats.org/presentationml/2006/main" mc:Ignorable="mv" mc:PreserveAttributes="mv:*">
   <p:cSld>
     <p:spTree>
@@ -10391,15 +10593,7 @@
           <a:p>
             <a:r>
               <a:rPr lang="en-US" dirty="0" smtClean="0"/>
-              <a:t>SAGA</a:t>
-            </a:r>
-            <a:r>
-              <a:rPr lang="en-US" dirty="0" smtClean="0"/>
-              <a:t>: Provides </a:t>
-            </a:r>
-            <a:r>
-              <a:rPr lang="en-US" dirty="0" smtClean="0"/>
-              <a:t>uniform access layers to </a:t>
+              <a:t>SAGA: Provides uniform access layers to </a:t>
             </a:r>
             <a:r>
               <a:rPr lang="en-US" dirty="0" err="1" smtClean="0"/>
@@ -10407,11 +10601,7 @@
             </a:r>
             <a:r>
               <a:rPr lang="en-US" dirty="0" smtClean="0"/>
-              <a:t> </a:t>
-            </a:r>
-            <a:r>
-              <a:rPr lang="en-US" dirty="0" smtClean="0"/>
-              <a:t>CI</a:t>
+              <a:t> CI</a:t>
             </a:r>
             <a:endParaRPr lang="en-US" dirty="0"/>
           </a:p>
@@ -10433,7 +10623,7 @@
 </p:sld>
 </file>
 
-<file path=ppt/slides/slide12.xml><?xml version="1.0" encoding="utf-8"?>
+<file path=ppt/slides/slide13.xml><?xml version="1.0" encoding="utf-8"?>
 <p:sld xmlns:a="http://schemas.openxmlformats.org/drawingml/2006/main" xmlns:r="http://schemas.openxmlformats.org/officeDocument/2006/relationships" xmlns:mc="http://schemas.openxmlformats.org/markup-compatibility/2006" xmlns:mv="urn:schemas-microsoft-com:mac:vml" xmlns:p="http://schemas.openxmlformats.org/presentationml/2006/main" mc:Ignorable="mv" mc:PreserveAttributes="mv:*">
   <p:cSld>
     <p:spTree>
@@ -10493,15 +10683,7 @@
           <a:p>
             <a:r>
               <a:rPr lang="en-US" sz="2400" dirty="0" smtClean="0"/>
-              <a:t>SAGA: To </a:t>
-            </a:r>
-            <a:r>
-              <a:rPr lang="en-US" sz="2400" dirty="0" smtClean="0"/>
-              <a:t>provide uniform access layers to</a:t>
-            </a:r>
-            <a:r>
-              <a:rPr lang="en-US" sz="2400" dirty="0" smtClean="0"/>
-              <a:t> heterogeneous CI</a:t>
+              <a:t>SAGA: To provide uniform access layers to heterogeneous CI</a:t>
             </a:r>
             <a:endParaRPr lang="en-US" sz="2400" dirty="0"/>
           </a:p>
@@ -10522,7 +10704,7 @@
 </p:sld>
 </file>
 
-<file path=ppt/slides/slide13.xml><?xml version="1.0" encoding="utf-8"?>
+<file path=ppt/slides/slide14.xml><?xml version="1.0" encoding="utf-8"?>
 <p:sld xmlns:a="http://schemas.openxmlformats.org/drawingml/2006/main" xmlns:r="http://schemas.openxmlformats.org/officeDocument/2006/relationships" xmlns:mc="http://schemas.openxmlformats.org/markup-compatibility/2006" xmlns:mv="urn:schemas-microsoft-com:mac:vml" xmlns:p="http://schemas.openxmlformats.org/presentationml/2006/main" mc:Ignorable="mv" mc:PreserveAttributes="mv:*">
   <p:cSld>
     <p:spTree>
@@ -10636,7 +10818,7 @@
 </p:sld>
 </file>
 
-<file path=ppt/slides/slide14.xml><?xml version="1.0" encoding="utf-8"?>
+<file path=ppt/slides/slide15.xml><?xml version="1.0" encoding="utf-8"?>
 <p:sld xmlns:a="http://schemas.openxmlformats.org/drawingml/2006/main" xmlns:r="http://schemas.openxmlformats.org/officeDocument/2006/relationships" xmlns:mc="http://schemas.openxmlformats.org/markup-compatibility/2006" xmlns:mv="urn:schemas-microsoft-com:mac:vml" xmlns:p="http://schemas.openxmlformats.org/presentationml/2006/main" mc:Ignorable="mv" mc:PreserveAttributes="mv:*">
   <p:cSld>
     <p:spTree>
@@ -10693,7 +10875,7 @@
             <a:fld id="{D7EEED34-8CD6-0C49-8D66-19FEDD51CB4E}" type="slidenum">
               <a:rPr lang="en-US"/>
               <a:pPr/>
-              <a:t>14</a:t>
+              <a:t>15</a:t>
             </a:fld>
             <a:endParaRPr lang="en-US"/>
           </a:p>
@@ -14081,7 +14263,7 @@
 </p:sld>
 </file>
 
-<file path=ppt/slides/slide15.xml><?xml version="1.0" encoding="utf-8"?>
+<file path=ppt/slides/slide16.xml><?xml version="1.0" encoding="utf-8"?>
 <p:sld xmlns:a="http://schemas.openxmlformats.org/drawingml/2006/main" xmlns:r="http://schemas.openxmlformats.org/officeDocument/2006/relationships" xmlns:mc="http://schemas.openxmlformats.org/markup-compatibility/2006" xmlns:mv="urn:schemas-microsoft-com:mac:vml" xmlns:p="http://schemas.openxmlformats.org/presentationml/2006/main" mc:Ignorable="mv" mc:PreserveAttributes="mv:*">
   <p:cSld>
     <p:spTree>
@@ -14256,10 +14438,90 @@
   <p:clrMapOvr>
     <a:masterClrMapping/>
   </p:clrMapOvr>
+  <p:timing>
+    <p:tnLst>
+      <p:par>
+        <p:cTn id="1" dur="indefinite" restart="never" nodeType="tmRoot"/>
+      </p:par>
+    </p:tnLst>
+  </p:timing>
 </p:sld>
 </file>
 
 <file path=ppt/slides/slide2.xml><?xml version="1.0" encoding="utf-8"?>
+<p:sld xmlns:a="http://schemas.openxmlformats.org/drawingml/2006/main" xmlns:r="http://schemas.openxmlformats.org/officeDocument/2006/relationships" xmlns:mc="http://schemas.openxmlformats.org/markup-compatibility/2006" xmlns:mv="urn:schemas-microsoft-com:mac:vml" xmlns:p="http://schemas.openxmlformats.org/presentationml/2006/main" mc:Ignorable="mv" mc:PreserveAttributes="mv:*">
+  <p:cSld>
+    <p:spTree>
+      <p:nvGrpSpPr>
+        <p:cNvPr id="1" name=""/>
+        <p:cNvGrpSpPr/>
+        <p:nvPr/>
+      </p:nvGrpSpPr>
+      <p:grpSpPr>
+        <a:xfrm>
+          <a:off x="0" y="0"/>
+          <a:ext cx="0" cy="0"/>
+          <a:chOff x="0" y="0"/>
+          <a:chExt cx="0" cy="0"/>
+        </a:xfrm>
+      </p:grpSpPr>
+      <p:sp>
+        <p:nvSpPr>
+          <p:cNvPr id="4" name="Title 3"/>
+          <p:cNvSpPr>
+            <a:spLocks noGrp="1"/>
+          </p:cNvSpPr>
+          <p:nvPr>
+            <p:ph type="title"/>
+          </p:nvPr>
+        </p:nvSpPr>
+        <p:spPr/>
+        <p:txBody>
+          <a:bodyPr/>
+          <a:lstStyle/>
+          <a:p>
+            <a:r>
+              <a:rPr lang="en-US" dirty="0" smtClean="0"/>
+              <a:t>All material from this tutorial can be found at:</a:t>
+            </a:r>
+            <a:br>
+              <a:rPr lang="en-US" dirty="0" smtClean="0"/>
+            </a:br>
+            <a:r>
+              <a:rPr lang="en-US" dirty="0" smtClean="0"/>
+              <a:t/>
+            </a:r>
+            <a:br>
+              <a:rPr lang="en-US" dirty="0" smtClean="0"/>
+            </a:br>
+            <a:r>
+              <a:rPr lang="en-US" sz="1400" b="1" dirty="0" smtClean="0"/>
+              <a:t>http</a:t>
+            </a:r>
+            <a:r>
+              <a:rPr lang="en-US" sz="1400" b="1" dirty="0" smtClean="0"/>
+              <a:t>://saga.cct.lsu.edu/software/cpp/documentation/tutorials/loni-training-2010</a:t>
+            </a:r>
+            <a:endParaRPr lang="en-US" sz="1400" b="1" dirty="0"/>
+          </a:p>
+        </p:txBody>
+      </p:sp>
+    </p:spTree>
+  </p:cSld>
+  <p:clrMapOvr>
+    <a:masterClrMapping/>
+  </p:clrMapOvr>
+  <p:timing>
+    <p:tnLst>
+      <p:par>
+        <p:cTn id="1" dur="indefinite" restart="never" nodeType="tmRoot"/>
+      </p:par>
+    </p:tnLst>
+  </p:timing>
+</p:sld>
+</file>
+
+<file path=ppt/slides/slide3.xml><?xml version="1.0" encoding="utf-8"?>
 <p:sld xmlns:a="http://schemas.openxmlformats.org/drawingml/2006/main" xmlns:r="http://schemas.openxmlformats.org/officeDocument/2006/relationships" xmlns:mc="http://schemas.openxmlformats.org/markup-compatibility/2006" xmlns:mv="urn:schemas-microsoft-com:mac:vml" xmlns:p="http://schemas.openxmlformats.org/presentationml/2006/main" mc:Ignorable="mv" mc:PreserveAttributes="mv:*">
   <p:cSld>
     <p:spTree>
@@ -14447,45 +14709,21 @@
             <a:pPr lvl="2"/>
             <a:r>
               <a:rPr lang="en-US" dirty="0" smtClean="0"/>
-              <a:t>Control</a:t>
-            </a:r>
+              <a:t>Control/Coordination &amp; execution over Heterogeneous sites</a:t>
+            </a:r>
+          </a:p>
+          <a:p>
+            <a:pPr lvl="2"/>
             <a:r>
               <a:rPr lang="en-US" dirty="0" smtClean="0"/>
-              <a:t>/</a:t>
-            </a:r>
+              <a:t>Complex Design point/Models of Distributed Applications, </a:t>
+            </a:r>
+          </a:p>
+          <a:p>
+            <a:pPr lvl="3"/>
             <a:r>
               <a:rPr lang="en-US" dirty="0" smtClean="0"/>
-              <a:t>Coordination &amp; execution over</a:t>
-            </a:r>
-            <a:r>
-              <a:rPr lang="en-US" dirty="0" smtClean="0"/>
-              <a:t> Heterogeneous </a:t>
-            </a:r>
-            <a:r>
-              <a:rPr lang="en-US" dirty="0" smtClean="0"/>
-              <a:t>sites</a:t>
-            </a:r>
-          </a:p>
-          <a:p>
-            <a:pPr lvl="2"/>
-            <a:r>
-              <a:rPr lang="en-US" dirty="0" smtClean="0"/>
-              <a:t>Complex </a:t>
-            </a:r>
-            <a:r>
-              <a:rPr lang="en-US" dirty="0" smtClean="0"/>
-              <a:t>Design point/Models of Distributed Applications, </a:t>
-            </a:r>
-          </a:p>
-          <a:p>
-            <a:pPr lvl="3"/>
-            <a:r>
-              <a:rPr lang="en-US" dirty="0" smtClean="0"/>
-              <a:t>Reasons for using distributed CI -- more than (peak) performance </a:t>
-            </a:r>
-            <a:r>
-              <a:rPr lang="en-US" dirty="0" smtClean="0"/>
-              <a:t>result</a:t>
+              <a:t>Reasons for using distributed CI -- more than (peak) performance result</a:t>
             </a:r>
           </a:p>
           <a:p>
@@ -14535,19 +14773,7 @@
               <a:rPr lang="en-US" dirty="0" smtClean="0">
                 <a:sym typeface="Arial" pitchFamily="-110" charset="0"/>
               </a:rPr>
-              <a:t>See: DPA Survey </a:t>
-            </a:r>
-            <a:r>
-              <a:rPr lang="en-US" dirty="0" smtClean="0">
-                <a:sym typeface="Arial" pitchFamily="-110" charset="0"/>
-              </a:rPr>
-              <a:t>Paper</a:t>
-            </a:r>
-            <a:r>
-              <a:rPr lang="en-US" dirty="0" smtClean="0">
-                <a:sym typeface="Arial" pitchFamily="-110" charset="0"/>
-              </a:rPr>
-              <a:t>:</a:t>
+              <a:t>See: DPA Survey Paper:</a:t>
             </a:r>
           </a:p>
           <a:p>
@@ -14583,7 +14809,7 @@
 </p:sld>
 </file>
 
-<file path=ppt/slides/slide3.xml><?xml version="1.0" encoding="utf-8"?>
+<file path=ppt/slides/slide4.xml><?xml version="1.0" encoding="utf-8"?>
 <p:sld xmlns:a="http://schemas.openxmlformats.org/drawingml/2006/main" xmlns:r="http://schemas.openxmlformats.org/officeDocument/2006/relationships" xmlns:mc="http://schemas.openxmlformats.org/markup-compatibility/2006" xmlns:mv="urn:schemas-microsoft-com:mac:vml" xmlns:p="http://schemas.openxmlformats.org/presentationml/2006/main" mc:Ignorable="mv" mc:PreserveAttributes="mv:*">
   <p:cSld>
     <p:spTree>
@@ -15189,7 +15415,7 @@
 </p:sld>
 </file>
 
-<file path=ppt/slides/slide4.xml><?xml version="1.0" encoding="utf-8"?>
+<file path=ppt/slides/slide5.xml><?xml version="1.0" encoding="utf-8"?>
 <p:sld xmlns:a="http://schemas.openxmlformats.org/drawingml/2006/main" xmlns:r="http://schemas.openxmlformats.org/officeDocument/2006/relationships" xmlns:mc="http://schemas.openxmlformats.org/markup-compatibility/2006" xmlns:mv="urn:schemas-microsoft-com:mac:vml" xmlns:p="http://schemas.openxmlformats.org/presentationml/2006/main" mc:Ignorable="mv" mc:PreserveAttributes="mv:*">
   <p:cSld>
     <p:spTree>
@@ -15282,7 +15508,7 @@
 </p:sld>
 </file>
 
-<file path=ppt/slides/slide5.xml><?xml version="1.0" encoding="utf-8"?>
+<file path=ppt/slides/slide6.xml><?xml version="1.0" encoding="utf-8"?>
 <p:sld xmlns:a="http://schemas.openxmlformats.org/drawingml/2006/main" xmlns:r="http://schemas.openxmlformats.org/officeDocument/2006/relationships" xmlns:mc="http://schemas.openxmlformats.org/markup-compatibility/2006" xmlns:mv="urn:schemas-microsoft-com:mac:vml" xmlns:p="http://schemas.openxmlformats.org/presentationml/2006/main" mc:Ignorable="mv" mc:PreserveAttributes="mv:*">
   <p:cSld>
     <p:spTree>
@@ -15357,200 +15583,6 @@
 </p:sld>
 </file>
 
-<file path=ppt/slides/slide6.xml><?xml version="1.0" encoding="utf-8"?>
-<p:sld xmlns:a="http://schemas.openxmlformats.org/drawingml/2006/main" xmlns:r="http://schemas.openxmlformats.org/officeDocument/2006/relationships" xmlns:mc="http://schemas.openxmlformats.org/markup-compatibility/2006" xmlns:mv="urn:schemas-microsoft-com:mac:vml" xmlns:p="http://schemas.openxmlformats.org/presentationml/2006/main" mc:Ignorable="mv" mc:PreserveAttributes="mv:*">
-  <p:cSld>
-    <p:spTree>
-      <p:nvGrpSpPr>
-        <p:cNvPr id="1" name=""/>
-        <p:cNvGrpSpPr/>
-        <p:nvPr/>
-      </p:nvGrpSpPr>
-      <p:grpSpPr>
-        <a:xfrm>
-          <a:off x="0" y="0"/>
-          <a:ext cx="0" cy="0"/>
-          <a:chOff x="0" y="0"/>
-          <a:chExt cx="0" cy="0"/>
-        </a:xfrm>
-      </p:grpSpPr>
-      <p:sp>
-        <p:nvSpPr>
-          <p:cNvPr id="2" name="Title 1"/>
-          <p:cNvSpPr>
-            <a:spLocks noGrp="1"/>
-          </p:cNvSpPr>
-          <p:nvPr>
-            <p:ph type="title"/>
-          </p:nvPr>
-        </p:nvSpPr>
-        <p:spPr/>
-        <p:txBody>
-          <a:bodyPr/>
-          <a:lstStyle/>
-          <a:p>
-            <a:r>
-              <a:rPr lang="en-US" dirty="0" smtClean="0"/>
-              <a:t>How is SAGA Used?</a:t>
-            </a:r>
-            <a:endParaRPr lang="en-US" dirty="0"/>
-          </a:p>
-        </p:txBody>
-      </p:sp>
-      <p:sp>
-        <p:nvSpPr>
-          <p:cNvPr id="3" name="Content Placeholder 2"/>
-          <p:cNvSpPr>
-            <a:spLocks noGrp="1"/>
-          </p:cNvSpPr>
-          <p:nvPr>
-            <p:ph idx="1"/>
-          </p:nvPr>
-        </p:nvSpPr>
-        <p:spPr>
-          <a:xfrm>
-            <a:off x="740895" y="2068618"/>
-            <a:ext cx="7984005" cy="4553160"/>
-          </a:xfrm>
-        </p:spPr>
-        <p:txBody>
-          <a:bodyPr>
-            <a:normAutofit/>
-          </a:bodyPr>
-          <a:lstStyle/>
-          <a:p>
-            <a:r>
-              <a:rPr lang="en-US" dirty="0" smtClean="0"/>
-              <a:t>SAGA is used to develop applications that are distributed by definition:</a:t>
-            </a:r>
-          </a:p>
-          <a:p>
-            <a:pPr lvl="1"/>
-            <a:r>
-              <a:rPr lang="en-US" dirty="0" smtClean="0"/>
-              <a:t>Simple extensions of “localized applications” (</a:t>
-            </a:r>
-            <a:r>
-              <a:rPr lang="en-US" dirty="0" err="1" smtClean="0"/>
-              <a:t>eg</a:t>
-            </a:r>
-            <a:r>
-              <a:rPr lang="en-US" dirty="0" smtClean="0"/>
-              <a:t> scripting)</a:t>
-            </a:r>
-          </a:p>
-          <a:p>
-            <a:pPr lvl="1"/>
-            <a:r>
-              <a:rPr lang="en-US" dirty="0" smtClean="0"/>
-              <a:t>Novel Distributed Programming Models (</a:t>
-            </a:r>
-            <a:r>
-              <a:rPr lang="en-US" dirty="0" err="1" smtClean="0"/>
-              <a:t>eg</a:t>
-            </a:r>
-            <a:r>
-              <a:rPr lang="en-US" dirty="0" smtClean="0"/>
-              <a:t> Rep-</a:t>
-            </a:r>
-            <a:r>
-              <a:rPr lang="en-US" dirty="0" err="1" smtClean="0"/>
-              <a:t>Exch</a:t>
-            </a:r>
-            <a:r>
-              <a:rPr lang="en-US" dirty="0" smtClean="0"/>
-              <a:t>)</a:t>
-            </a:r>
-          </a:p>
-          <a:p>
-            <a:r>
-              <a:rPr lang="en-US" dirty="0" smtClean="0"/>
-              <a:t>SAGA: Build tools and abstractions that enable the execution of applications over distributed resources, without modifying the applications</a:t>
-            </a:r>
-          </a:p>
-          <a:p>
-            <a:pPr lvl="1"/>
-            <a:r>
-              <a:rPr lang="en-US" dirty="0" err="1" smtClean="0"/>
-              <a:t>Eg</a:t>
-            </a:r>
-            <a:r>
-              <a:rPr lang="en-US" dirty="0" smtClean="0"/>
-              <a:t>. Infrastructure Independent Pilot-Jobs</a:t>
-            </a:r>
-          </a:p>
-          <a:p>
-            <a:r>
-              <a:rPr lang="en-US" dirty="0" smtClean="0"/>
-              <a:t>SAGA: To provide uniform access layers to </a:t>
-            </a:r>
-            <a:r>
-              <a:rPr lang="en-US" dirty="0" err="1" smtClean="0"/>
-              <a:t>heter</a:t>
-            </a:r>
-            <a:r>
-              <a:rPr lang="en-US" dirty="0" smtClean="0"/>
-              <a:t>. CI</a:t>
-            </a:r>
-          </a:p>
-          <a:p>
-            <a:pPr lvl="1"/>
-            <a:r>
-              <a:rPr lang="en-US" dirty="0" smtClean="0"/>
-              <a:t>Uniform access to EGI (ARC, </a:t>
-            </a:r>
-            <a:r>
-              <a:rPr lang="en-US" dirty="0" err="1" smtClean="0"/>
-              <a:t>gLite</a:t>
-            </a:r>
-            <a:r>
-              <a:rPr lang="en-US" dirty="0" smtClean="0"/>
-              <a:t>, </a:t>
-            </a:r>
-            <a:r>
-              <a:rPr lang="en-US" dirty="0" err="1" smtClean="0"/>
-              <a:t>Globus</a:t>
-            </a:r>
-            <a:r>
-              <a:rPr lang="en-US" dirty="0" smtClean="0"/>
-              <a:t> and </a:t>
-            </a:r>
-            <a:r>
-              <a:rPr lang="en-US" dirty="0" err="1" smtClean="0"/>
-              <a:t>Unicore</a:t>
-            </a:r>
-            <a:r>
-              <a:rPr lang="en-US" dirty="0" smtClean="0"/>
-              <a:t>/</a:t>
-            </a:r>
-            <a:r>
-              <a:rPr lang="en-US" dirty="0" smtClean="0"/>
-              <a:t>BES</a:t>
-            </a:r>
-            <a:r>
-              <a:rPr lang="en-US" dirty="0" smtClean="0"/>
-              <a:t>)</a:t>
-            </a:r>
-            <a:endParaRPr lang="en-US" dirty="0" smtClean="0"/>
-          </a:p>
-          <a:p>
-            <a:pPr lvl="1"/>
-            <a:r>
-              <a:rPr lang="en-US" dirty="0" smtClean="0"/>
-              <a:t>Simplify the building of tools and Gateways or MW applications, workers submitted to &gt;8 back-ends </a:t>
-            </a:r>
-            <a:endParaRPr lang="en-US" dirty="0"/>
-          </a:p>
-        </p:txBody>
-      </p:sp>
-    </p:spTree>
-  </p:cSld>
-  <p:clrMapOvr>
-    <a:masterClrMapping/>
-  </p:clrMapOvr>
-</p:sld>
-</file>
-
 <file path=ppt/slides/slide7.xml><?xml version="1.0" encoding="utf-8"?>
 <p:sld xmlns:a="http://schemas.openxmlformats.org/drawingml/2006/main" xmlns:r="http://schemas.openxmlformats.org/officeDocument/2006/relationships" xmlns:mc="http://schemas.openxmlformats.org/markup-compatibility/2006" xmlns:mv="urn:schemas-microsoft-com:mac:vml" xmlns:p="http://schemas.openxmlformats.org/presentationml/2006/main" mc:Ignorable="mv" mc:PreserveAttributes="mv:*">
   <p:cSld>
@@ -15570,7 +15602,7 @@
       </p:grpSpPr>
       <p:sp>
         <p:nvSpPr>
-          <p:cNvPr id="5" name="Title 4"/>
+          <p:cNvPr id="2" name="Title 1"/>
           <p:cNvSpPr>
             <a:spLocks noGrp="1"/>
           </p:cNvSpPr>
@@ -15580,41 +15612,31 @@
         </p:nvSpPr>
         <p:spPr/>
         <p:txBody>
-          <a:bodyPr>
-            <a:noAutofit/>
-          </a:bodyPr>
+          <a:bodyPr/>
           <a:lstStyle/>
           <a:p>
             <a:r>
-              <a:rPr lang="en-US" sz="2400" dirty="0" smtClean="0"/>
-              <a:t>SAGA: Develop </a:t>
-            </a:r>
-            <a:r>
-              <a:rPr lang="en-US" sz="2400" dirty="0" smtClean="0"/>
-              <a:t>applications that are distributed by </a:t>
-            </a:r>
-            <a:r>
-              <a:rPr lang="en-US" sz="2400" dirty="0" smtClean="0"/>
-              <a:t>definition</a:t>
-            </a:r>
-            <a:endParaRPr lang="en-US" sz="2400" dirty="0"/>
-          </a:p>
-        </p:txBody>
-      </p:sp>
-      <p:sp>
-        <p:nvSpPr>
-          <p:cNvPr id="6" name="Content Placeholder 5"/>
+              <a:rPr lang="en-US" dirty="0" smtClean="0"/>
+              <a:t>How is SAGA Used?</a:t>
+            </a:r>
+            <a:endParaRPr lang="en-US" dirty="0"/>
+          </a:p>
+        </p:txBody>
+      </p:sp>
+      <p:sp>
+        <p:nvSpPr>
+          <p:cNvPr id="3" name="Content Placeholder 2"/>
           <p:cNvSpPr>
             <a:spLocks noGrp="1"/>
           </p:cNvSpPr>
           <p:nvPr>
-            <p:ph sz="half" idx="2"/>
+            <p:ph idx="1"/>
           </p:nvPr>
         </p:nvSpPr>
         <p:spPr>
           <a:xfrm>
-            <a:off x="406400" y="1397001"/>
-            <a:ext cx="4495800" cy="4978399"/>
+            <a:off x="740895" y="2068618"/>
+            <a:ext cx="7984005" cy="4553160"/>
           </a:xfrm>
         </p:spPr>
         <p:txBody>
@@ -15624,100 +15646,124 @@
           <a:lstStyle/>
           <a:p>
             <a:r>
-              <a:rPr lang="en-US" sz="1700" dirty="0" smtClean="0"/>
-              <a:t>How to develop a simple MR that is interoperable across infrastructure concurrently?</a:t>
-            </a:r>
-            <a:endParaRPr lang="en-US" sz="1700" dirty="0" smtClean="0"/>
-          </a:p>
-          <a:p>
-            <a:r>
-              <a:rPr lang="en-US" sz="1700" dirty="0" smtClean="0"/>
-              <a:t>Same </a:t>
-            </a:r>
-            <a:r>
-              <a:rPr lang="en-US" sz="1700" dirty="0" smtClean="0"/>
-              <a:t>application,</a:t>
-            </a:r>
-            <a:r>
-              <a:rPr lang="en-US" sz="1700" dirty="0" smtClean="0"/>
-              <a:t> same programming model:</a:t>
+              <a:rPr lang="en-US" dirty="0" smtClean="0"/>
+              <a:t>SAGA is used to develop applications that are distributed by definition:</a:t>
             </a:r>
           </a:p>
           <a:p>
             <a:pPr lvl="1"/>
             <a:r>
-              <a:rPr lang="en-US" sz="1700" dirty="0" smtClean="0"/>
-              <a:t>Very different performance </a:t>
-            </a:r>
-            <a:r>
-              <a:rPr lang="en-US" sz="1700" dirty="0" smtClean="0"/>
-              <a:t>dependence</a:t>
-            </a:r>
-            <a:endParaRPr lang="en-US" sz="1700" dirty="0" smtClean="0"/>
-          </a:p>
-          <a:p>
-            <a:r>
-              <a:rPr lang="en-US" sz="1700" dirty="0" smtClean="0"/>
-              <a:t>Same application, different </a:t>
-            </a:r>
-            <a:r>
-              <a:rPr lang="en-US" sz="1700" dirty="0" smtClean="0"/>
-              <a:t>programming </a:t>
-            </a:r>
-            <a:r>
-              <a:rPr lang="en-US" sz="1700" dirty="0" smtClean="0"/>
-              <a:t>models</a:t>
-            </a:r>
-            <a:endParaRPr lang="en-US" sz="1700" dirty="0" smtClean="0"/>
+              <a:rPr lang="en-US" dirty="0" smtClean="0"/>
+              <a:t>Simple extensions of “localized applications” (</a:t>
+            </a:r>
+            <a:r>
+              <a:rPr lang="en-US" dirty="0" err="1" smtClean="0"/>
+              <a:t>eg</a:t>
+            </a:r>
+            <a:r>
+              <a:rPr lang="en-US" dirty="0" smtClean="0"/>
+              <a:t> scripting)</a:t>
+            </a:r>
           </a:p>
           <a:p>
             <a:pPr lvl="1"/>
             <a:r>
-              <a:rPr lang="en-US" sz="1700" dirty="0" smtClean="0"/>
-              <a:t>Very </a:t>
-            </a:r>
-            <a:r>
-              <a:rPr lang="en-US" sz="1700" dirty="0" smtClean="0"/>
-              <a:t>different performance </a:t>
-            </a:r>
-            <a:r>
-              <a:rPr lang="en-US" sz="1700" dirty="0" smtClean="0"/>
-              <a:t>dependence</a:t>
-            </a:r>
-          </a:p>
-          <a:p>
-            <a:pPr lvl="1">
-              <a:buNone/>
-            </a:pPr>
-            <a:endParaRPr lang="en-US" sz="1700" dirty="0" smtClean="0"/>
-          </a:p>
-        </p:txBody>
-      </p:sp>
-      <p:pic>
-        <p:nvPicPr>
-          <p:cNvPr id="7" name="Content Placeholder 3" descr="saga_mapreduce_schema.png"/>
-          <p:cNvPicPr>
-            <a:picLocks noChangeAspect="1"/>
-          </p:cNvPicPr>
-          <p:nvPr/>
-        </p:nvPicPr>
-        <p:blipFill>
-          <a:blip r:embed="rId2"/>
-          <a:srcRect l="-10578" r="-10578"/>
-          <a:stretch>
-            <a:fillRect/>
-          </a:stretch>
-        </p:blipFill>
-        <p:spPr>
-          <a:xfrm>
-            <a:off x="4368800" y="1592712"/>
-            <a:ext cx="4632959" cy="4782688"/>
-          </a:xfrm>
-          <a:prstGeom prst="rect">
-            <a:avLst/>
-          </a:prstGeom>
-        </p:spPr>
-      </p:pic>
+              <a:rPr lang="en-US" dirty="0" smtClean="0"/>
+              <a:t>Novel Distributed Programming Models (</a:t>
+            </a:r>
+            <a:r>
+              <a:rPr lang="en-US" dirty="0" err="1" smtClean="0"/>
+              <a:t>eg</a:t>
+            </a:r>
+            <a:r>
+              <a:rPr lang="en-US" dirty="0" smtClean="0"/>
+              <a:t> Rep-</a:t>
+            </a:r>
+            <a:r>
+              <a:rPr lang="en-US" dirty="0" err="1" smtClean="0"/>
+              <a:t>Exch</a:t>
+            </a:r>
+            <a:r>
+              <a:rPr lang="en-US" dirty="0" smtClean="0"/>
+              <a:t>)</a:t>
+            </a:r>
+          </a:p>
+          <a:p>
+            <a:r>
+              <a:rPr lang="en-US" dirty="0" smtClean="0"/>
+              <a:t>SAGA: Build tools and implement abstractions that enable the execution of applications over distributed resources, </a:t>
+            </a:r>
+            <a:r>
+              <a:rPr lang="en-US" i="1" dirty="0" smtClean="0"/>
+              <a:t>without modifying the applications</a:t>
+            </a:r>
+          </a:p>
+          <a:p>
+            <a:pPr lvl="1"/>
+            <a:r>
+              <a:rPr lang="en-US" dirty="0" err="1" smtClean="0"/>
+              <a:t>Eg</a:t>
+            </a:r>
+            <a:r>
+              <a:rPr lang="en-US" dirty="0" smtClean="0"/>
+              <a:t>. Infrastructure Independent Pilot-Jobs</a:t>
+            </a:r>
+          </a:p>
+          <a:p>
+            <a:r>
+              <a:rPr lang="en-US" dirty="0" smtClean="0"/>
+              <a:t>SAGA: To provide uniform access layers to </a:t>
+            </a:r>
+            <a:r>
+              <a:rPr lang="en-US" dirty="0" err="1" smtClean="0"/>
+              <a:t>heter</a:t>
+            </a:r>
+            <a:r>
+              <a:rPr lang="en-US" dirty="0" smtClean="0"/>
+              <a:t>. CI</a:t>
+            </a:r>
+          </a:p>
+          <a:p>
+            <a:pPr lvl="1"/>
+            <a:r>
+              <a:rPr lang="en-US" dirty="0" smtClean="0"/>
+              <a:t>Uniform access to EGI (ARC, </a:t>
+            </a:r>
+            <a:r>
+              <a:rPr lang="en-US" dirty="0" err="1" smtClean="0"/>
+              <a:t>gLite</a:t>
+            </a:r>
+            <a:r>
+              <a:rPr lang="en-US" dirty="0" smtClean="0"/>
+              <a:t>, </a:t>
+            </a:r>
+            <a:r>
+              <a:rPr lang="en-US" dirty="0" err="1" smtClean="0"/>
+              <a:t>Globus</a:t>
+            </a:r>
+            <a:r>
+              <a:rPr lang="en-US" dirty="0" smtClean="0"/>
+              <a:t> and </a:t>
+            </a:r>
+            <a:r>
+              <a:rPr lang="en-US" dirty="0" err="1" smtClean="0"/>
+              <a:t>Unicore</a:t>
+            </a:r>
+            <a:r>
+              <a:rPr lang="en-US" dirty="0" smtClean="0"/>
+              <a:t>/BES)</a:t>
+            </a:r>
+          </a:p>
+          <a:p>
+            <a:pPr lvl="1"/>
+            <a:r>
+              <a:rPr lang="en-US" dirty="0" smtClean="0"/>
+              <a:t>Simplify the building of tools and Gateways or MW applications, workers submitted to &gt;8 back-ends </a:t>
+            </a:r>
+            <a:endParaRPr lang="en-US" dirty="0"/>
+          </a:p>
+        </p:txBody>
+      </p:sp>
     </p:spTree>
   </p:cSld>
   <p:clrMapOvr>
@@ -15752,6 +15798,149 @@
       </p:grpSpPr>
       <p:sp>
         <p:nvSpPr>
+          <p:cNvPr id="5" name="Title 4"/>
+          <p:cNvSpPr>
+            <a:spLocks noGrp="1"/>
+          </p:cNvSpPr>
+          <p:nvPr>
+            <p:ph type="title"/>
+          </p:nvPr>
+        </p:nvSpPr>
+        <p:spPr/>
+        <p:txBody>
+          <a:bodyPr>
+            <a:noAutofit/>
+          </a:bodyPr>
+          <a:lstStyle/>
+          <a:p>
+            <a:r>
+              <a:rPr lang="en-US" sz="2400" dirty="0" smtClean="0"/>
+              <a:t>SAGA: Develop applications that are distributed by definition</a:t>
+            </a:r>
+            <a:endParaRPr lang="en-US" sz="2400" dirty="0"/>
+          </a:p>
+        </p:txBody>
+      </p:sp>
+      <p:sp>
+        <p:nvSpPr>
+          <p:cNvPr id="6" name="Content Placeholder 5"/>
+          <p:cNvSpPr>
+            <a:spLocks noGrp="1"/>
+          </p:cNvSpPr>
+          <p:nvPr>
+            <p:ph sz="half" idx="2"/>
+          </p:nvPr>
+        </p:nvSpPr>
+        <p:spPr>
+          <a:xfrm>
+            <a:off x="406400" y="1397001"/>
+            <a:ext cx="4495800" cy="4978399"/>
+          </a:xfrm>
+        </p:spPr>
+        <p:txBody>
+          <a:bodyPr>
+            <a:normAutofit/>
+          </a:bodyPr>
+          <a:lstStyle/>
+          <a:p>
+            <a:r>
+              <a:rPr lang="en-US" sz="1700" dirty="0" smtClean="0"/>
+              <a:t>How to develop a simple MR that is interoperable across infrastructure concurrently?</a:t>
+            </a:r>
+          </a:p>
+          <a:p>
+            <a:r>
+              <a:rPr lang="en-US" sz="1700" dirty="0" smtClean="0"/>
+              <a:t>Same application, same programming model:</a:t>
+            </a:r>
+          </a:p>
+          <a:p>
+            <a:pPr lvl="1"/>
+            <a:r>
+              <a:rPr lang="en-US" sz="1700" dirty="0" smtClean="0"/>
+              <a:t>Very different performance dependence</a:t>
+            </a:r>
+          </a:p>
+          <a:p>
+            <a:r>
+              <a:rPr lang="en-US" sz="1700" dirty="0" smtClean="0"/>
+              <a:t>Same application, different programming models</a:t>
+            </a:r>
+          </a:p>
+          <a:p>
+            <a:pPr lvl="1"/>
+            <a:r>
+              <a:rPr lang="en-US" sz="1700" dirty="0" smtClean="0"/>
+              <a:t>Very different performance dependence</a:t>
+            </a:r>
+          </a:p>
+          <a:p>
+            <a:pPr lvl="1">
+              <a:buNone/>
+            </a:pPr>
+            <a:endParaRPr lang="en-US" sz="1700" dirty="0" smtClean="0"/>
+          </a:p>
+        </p:txBody>
+      </p:sp>
+      <p:pic>
+        <p:nvPicPr>
+          <p:cNvPr id="7" name="Content Placeholder 3" descr="saga_mapreduce_schema.png"/>
+          <p:cNvPicPr>
+            <a:picLocks noChangeAspect="1"/>
+          </p:cNvPicPr>
+          <p:nvPr/>
+        </p:nvPicPr>
+        <p:blipFill>
+          <a:blip r:embed="rId2"/>
+          <a:srcRect l="-10578" r="-10578"/>
+          <a:stretch>
+            <a:fillRect/>
+          </a:stretch>
+        </p:blipFill>
+        <p:spPr>
+          <a:xfrm>
+            <a:off x="4368800" y="1592712"/>
+            <a:ext cx="4632959" cy="4782688"/>
+          </a:xfrm>
+          <a:prstGeom prst="rect">
+            <a:avLst/>
+          </a:prstGeom>
+        </p:spPr>
+      </p:pic>
+    </p:spTree>
+  </p:cSld>
+  <p:clrMapOvr>
+    <a:masterClrMapping/>
+  </p:clrMapOvr>
+  <p:timing>
+    <p:tnLst>
+      <p:par>
+        <p:cTn id="1" dur="indefinite" restart="never" nodeType="tmRoot"/>
+      </p:par>
+    </p:tnLst>
+  </p:timing>
+</p:sld>
+</file>
+
+<file path=ppt/slides/slide9.xml><?xml version="1.0" encoding="utf-8"?>
+<p:sld xmlns:a="http://schemas.openxmlformats.org/drawingml/2006/main" xmlns:r="http://schemas.openxmlformats.org/officeDocument/2006/relationships" xmlns:mc="http://schemas.openxmlformats.org/markup-compatibility/2006" xmlns:mv="urn:schemas-microsoft-com:mac:vml" xmlns:p="http://schemas.openxmlformats.org/presentationml/2006/main" mc:Ignorable="mv" mc:PreserveAttributes="mv:*">
+  <p:cSld>
+    <p:spTree>
+      <p:nvGrpSpPr>
+        <p:cNvPr id="1" name=""/>
+        <p:cNvGrpSpPr/>
+        <p:nvPr/>
+      </p:nvGrpSpPr>
+      <p:grpSpPr>
+        <a:xfrm>
+          <a:off x="0" y="0"/>
+          <a:ext cx="0" cy="0"/>
+          <a:chOff x="0" y="0"/>
+          <a:chExt cx="0" cy="0"/>
+        </a:xfrm>
+      </p:grpSpPr>
+      <p:sp>
+        <p:nvSpPr>
           <p:cNvPr id="2" name="Title 1"/>
           <p:cNvSpPr>
             <a:spLocks noGrp="1"/>
@@ -15847,206 +16036,6 @@
           </a:prstGeom>
         </p:spPr>
       </p:pic>
-    </p:spTree>
-  </p:cSld>
-  <p:clrMapOvr>
-    <a:masterClrMapping/>
-  </p:clrMapOvr>
-</p:sld>
-</file>
-
-<file path=ppt/slides/slide9.xml><?xml version="1.0" encoding="utf-8"?>
-<p:sld xmlns:a="http://schemas.openxmlformats.org/drawingml/2006/main" xmlns:r="http://schemas.openxmlformats.org/officeDocument/2006/relationships" xmlns:mc="http://schemas.openxmlformats.org/markup-compatibility/2006" xmlns:mv="urn:schemas-microsoft-com:mac:vml" xmlns:p="http://schemas.openxmlformats.org/presentationml/2006/main" mc:Ignorable="mv" mc:PreserveAttributes="mv:*">
-  <p:cSld>
-    <p:spTree>
-      <p:nvGrpSpPr>
-        <p:cNvPr id="1" name=""/>
-        <p:cNvGrpSpPr/>
-        <p:nvPr/>
-      </p:nvGrpSpPr>
-      <p:grpSpPr>
-        <a:xfrm>
-          <a:off x="0" y="0"/>
-          <a:ext cx="0" cy="0"/>
-          <a:chOff x="0" y="0"/>
-          <a:chExt cx="0" cy="0"/>
-        </a:xfrm>
-      </p:grpSpPr>
-      <p:sp>
-        <p:nvSpPr>
-          <p:cNvPr id="2" name="Title 1"/>
-          <p:cNvSpPr>
-            <a:spLocks noGrp="1"/>
-          </p:cNvSpPr>
-          <p:nvPr>
-            <p:ph type="title"/>
-          </p:nvPr>
-        </p:nvSpPr>
-        <p:spPr/>
-        <p:txBody>
-          <a:bodyPr rtlCol="0">
-            <a:normAutofit/>
-          </a:bodyPr>
-          <a:lstStyle/>
-          <a:p>
-            <a:pPr eaLnBrk="1" fontAlgn="auto" hangingPunct="1">
-              <a:spcAft>
-                <a:spcPts val="0"/>
-              </a:spcAft>
-              <a:defRPr/>
-            </a:pPr>
-            <a:r>
-              <a:rPr lang="en-US" sz="2222" dirty="0" smtClean="0"/>
-              <a:t>Distributed Adaptive Replica Exchange (DARE)</a:t>
-            </a:r>
-            <a:r>
-              <a:rPr lang="en-US" sz="2800" dirty="0" smtClean="0"/>
-              <a:t/>
-            </a:r>
-            <a:br>
-              <a:rPr lang="en-US" sz="2800" dirty="0" smtClean="0"/>
-            </a:br>
-            <a:r>
-              <a:rPr lang="en-US" sz="2222" dirty="0" smtClean="0">
-                <a:solidFill>
-                  <a:schemeClr val="bg1">
-                    <a:lumMod val="75000"/>
-                  </a:schemeClr>
-                </a:solidFill>
-              </a:rPr>
-              <a:t>Multiple Pilot-Jobs on the “Distributed” </a:t>
-            </a:r>
-            <a:r>
-              <a:rPr lang="en-US" sz="2222" dirty="0" err="1" smtClean="0">
-                <a:solidFill>
-                  <a:schemeClr val="bg1">
-                    <a:lumMod val="75000"/>
-                  </a:schemeClr>
-                </a:solidFill>
-              </a:rPr>
-              <a:t>TeraGrid</a:t>
-            </a:r>
-            <a:endParaRPr lang="en-US" sz="2222" dirty="0" smtClean="0">
-              <a:solidFill>
-                <a:srgbClr val="800000"/>
-              </a:solidFill>
-              <a:latin typeface="Cooper Black"/>
-              <a:cs typeface="Cooper Black"/>
-            </a:endParaRPr>
-          </a:p>
-        </p:txBody>
-      </p:sp>
-      <p:sp>
-        <p:nvSpPr>
-          <p:cNvPr id="8" name="Content Placeholder 7"/>
-          <p:cNvSpPr>
-            <a:spLocks noGrp="1"/>
-          </p:cNvSpPr>
-          <p:nvPr>
-            <p:ph idx="1"/>
-          </p:nvPr>
-        </p:nvSpPr>
-        <p:spPr>
-          <a:xfrm>
-            <a:off x="892710" y="2011973"/>
-            <a:ext cx="7489289" cy="1366228"/>
-          </a:xfrm>
-        </p:spPr>
-        <p:txBody>
-          <a:bodyPr>
-            <a:normAutofit/>
-          </a:bodyPr>
-          <a:lstStyle/>
-          <a:p>
-            <a:r>
-              <a:rPr lang="en-US" dirty="0" smtClean="0"/>
-              <a:t>Ability to dynamically add HPC resources. On TG:</a:t>
-            </a:r>
-            <a:endParaRPr lang="en-US" dirty="0" smtClean="0"/>
-          </a:p>
-          <a:p>
-            <a:r>
-              <a:rPr lang="en-US" dirty="0" smtClean="0"/>
-              <a:t>Innovations in Distributed Algorithms:</a:t>
-            </a:r>
-          </a:p>
-          <a:p>
-            <a:pPr lvl="1"/>
-            <a:r>
-              <a:rPr lang="en-US" dirty="0" smtClean="0"/>
-              <a:t>Variants </a:t>
-            </a:r>
-            <a:r>
-              <a:rPr lang="en-US" dirty="0" smtClean="0"/>
-              <a:t>of  RE: Sync (local) </a:t>
-            </a:r>
-            <a:r>
-              <a:rPr lang="en-US" dirty="0" err="1" smtClean="0"/>
-              <a:t>vs</a:t>
-            </a:r>
-            <a:r>
-              <a:rPr lang="en-US" dirty="0" smtClean="0"/>
-              <a:t> </a:t>
-            </a:r>
-            <a:r>
-              <a:rPr lang="en-US" dirty="0" err="1" smtClean="0"/>
-              <a:t>async</a:t>
-            </a:r>
-            <a:r>
-              <a:rPr lang="en-US" dirty="0" smtClean="0"/>
-              <a:t> (distr.)</a:t>
-            </a:r>
-          </a:p>
-        </p:txBody>
-      </p:sp>
-      <p:pic>
-        <p:nvPicPr>
-          <p:cNvPr id="37894" name="Picture 7" descr="perf_distributed_number_replica-1.pdf"/>
-          <p:cNvPicPr>
-            <a:picLocks noChangeAspect="1"/>
-          </p:cNvPicPr>
-          <p:nvPr/>
-        </p:nvPicPr>
-        <p:blipFill>
-          <a:blip r:embed="rId2"/>
-          <a:srcRect/>
-          <a:stretch>
-            <a:fillRect/>
-          </a:stretch>
-        </p:blipFill>
-        <p:spPr bwMode="auto">
-          <a:xfrm>
-            <a:off x="626011" y="3746500"/>
-            <a:ext cx="3657600" cy="2552700"/>
-          </a:xfrm>
-          <a:prstGeom prst="rect">
-            <a:avLst/>
-          </a:prstGeom>
-          <a:noFill/>
-          <a:ln w="9525">
-            <a:noFill/>
-            <a:miter lim="800000"/>
-            <a:headEnd/>
-            <a:tailEnd/>
-          </a:ln>
-        </p:spPr>
-      </p:pic>
-      <p:graphicFrame>
-        <p:nvGraphicFramePr>
-          <p:cNvPr id="7" name="Chart 6"/>
-          <p:cNvGraphicFramePr/>
-          <p:nvPr/>
-        </p:nvGraphicFramePr>
-        <p:xfrm>
-          <a:off x="4888046" y="3644900"/>
-          <a:ext cx="3935959" cy="3073400"/>
-        </p:xfrm>
-        <a:graphic>
-          <a:graphicData uri="http://schemas.openxmlformats.org/drawingml/2006/chart">
-            <c:chart xmlns:c="http://schemas.openxmlformats.org/drawingml/2006/chart" xmlns:r="http://schemas.openxmlformats.org/officeDocument/2006/relationships" r:id="rId3"/>
-          </a:graphicData>
-        </a:graphic>
-      </p:graphicFrame>
     </p:spTree>
   </p:cSld>
   <p:clrMapOvr>

</xml_diff>

<commit_message>
Final tweaks to SAGA Intro+Conclusion
     Andre: I will stop the Introd at Slide 8. And restart at Slide 8



git-svn-id: file://localhost/tmp/svn2git/svn@3277 defb5e50-622e-49ec-a68e-d72c7db87b45
</commit_message>
<xml_diff>
--- a/tutorial/general_tutorial/SAGA-Intro-Conclusion.pptx
+++ b/tutorial/general_tutorial/SAGA-Intro-Conclusion.pptx
@@ -24,12 +24,12 @@
     <p:sldId id="263" r:id="rId12"/>
     <p:sldId id="264" r:id="rId13"/>
     <p:sldId id="277" r:id="rId14"/>
-    <p:sldId id="279" r:id="rId15"/>
-    <p:sldId id="272" r:id="rId16"/>
-    <p:sldId id="266" r:id="rId17"/>
+    <p:sldId id="278" r:id="rId15"/>
+    <p:sldId id="279" r:id="rId16"/>
+    <p:sldId id="272" r:id="rId17"/>
     <p:sldId id="265" r:id="rId18"/>
-    <p:sldId id="267" r:id="rId19"/>
-    <p:sldId id="278" r:id="rId20"/>
+    <p:sldId id="266" r:id="rId19"/>
+    <p:sldId id="267" r:id="rId20"/>
     <p:sldId id="269" r:id="rId21"/>
     <p:sldId id="268" r:id="rId22"/>
     <p:sldId id="280" r:id="rId23"/>
@@ -355,24 +355,24 @@
             </c:numRef>
           </c:val>
         </c:ser>
-        <c:axId val="627642504"/>
-        <c:axId val="524568760"/>
+        <c:axId val="627838200"/>
+        <c:axId val="492001288"/>
       </c:barChart>
       <c:catAx>
-        <c:axId val="627642504"/>
+        <c:axId val="627838200"/>
         <c:scaling>
           <c:orientation val="minMax"/>
         </c:scaling>
         <c:axPos val="b"/>
         <c:tickLblPos val="nextTo"/>
-        <c:crossAx val="524568760"/>
+        <c:crossAx val="492001288"/>
         <c:crosses val="autoZero"/>
         <c:auto val="1"/>
         <c:lblAlgn val="ctr"/>
         <c:lblOffset val="100"/>
       </c:catAx>
       <c:valAx>
-        <c:axId val="524568760"/>
+        <c:axId val="492001288"/>
         <c:scaling>
           <c:orientation val="minMax"/>
         </c:scaling>
@@ -380,7 +380,7 @@
         <c:majorGridlines/>
         <c:numFmt formatCode="General" sourceLinked="1"/>
         <c:tickLblPos val="nextTo"/>
-        <c:crossAx val="627642504"/>
+        <c:crossAx val="627838200"/>
         <c:crosses val="autoZero"/>
         <c:crossBetween val="between"/>
       </c:valAx>
@@ -478,7 +478,7 @@
             <a:fld id="{9A6AC4B2-6F12-454D-8DA7-7B9C78843B81}" type="datetimeFigureOut">
               <a:rPr lang="en-US" smtClean="0"/>
               <a:pPr/>
-              <a:t>11/28/10</a:t>
+              <a:t>11/29/10</a:t>
             </a:fld>
             <a:endParaRPr lang="en-US"/>
           </a:p>
@@ -641,7 +641,7 @@
             <a:fld id="{19F24AD4-A78B-B645-8B43-825B1EB2901C}" type="datetimeFigureOut">
               <a:rPr lang="en-US" smtClean="0"/>
               <a:pPr/>
-              <a:t>11/28/10</a:t>
+              <a:t>11/29/10</a:t>
             </a:fld>
             <a:endParaRPr lang="en-US"/>
           </a:p>
@@ -1227,7 +1227,7 @@
             <a:fld id="{ADB8239A-D789-5443-937F-338E3AE3D41C}" type="datetime1">
               <a:rPr lang="en-US" smtClean="0"/>
               <a:pPr/>
-              <a:t>11/28/10</a:t>
+              <a:t>11/29/10</a:t>
             </a:fld>
             <a:endParaRPr lang="en-US"/>
           </a:p>
@@ -1531,7 +1531,7 @@
             <a:fld id="{459EC1CE-E98D-704D-AD6F-6E3323A36483}" type="datetime1">
               <a:rPr lang="en-US" smtClean="0"/>
               <a:pPr/>
-              <a:t>11/28/10</a:t>
+              <a:t>11/29/10</a:t>
             </a:fld>
             <a:endParaRPr lang="en-US"/>
           </a:p>
@@ -1807,7 +1807,7 @@
             <a:fld id="{23E692A5-8B3E-1949-B0CC-6F0593ACFA8E}" type="datetime1">
               <a:rPr lang="en-US" smtClean="0"/>
               <a:pPr/>
-              <a:t>11/28/10</a:t>
+              <a:t>11/29/10</a:t>
             </a:fld>
             <a:endParaRPr lang="en-US"/>
           </a:p>
@@ -2099,7 +2099,7 @@
             <a:fld id="{C381DA14-A3C0-9C42-96F2-BEE3D5DE963D}" type="datetime1">
               <a:rPr lang="en-US" smtClean="0"/>
               <a:pPr/>
-              <a:t>11/28/10</a:t>
+              <a:t>11/29/10</a:t>
             </a:fld>
             <a:endParaRPr lang="en-US"/>
           </a:p>
@@ -2426,7 +2426,7 @@
             <a:fld id="{33319320-9A5F-694B-B7B5-C734EC93AAA2}" type="datetime1">
               <a:rPr lang="en-US" smtClean="0"/>
               <a:pPr/>
-              <a:t>11/28/10</a:t>
+              <a:t>11/29/10</a:t>
             </a:fld>
             <a:endParaRPr lang="en-US"/>
           </a:p>
@@ -2674,7 +2674,7 @@
             <a:fld id="{CF6CE397-A6E6-7547-B24A-92BB5049E0F2}" type="datetime1">
               <a:rPr lang="en-US" smtClean="0"/>
               <a:pPr/>
-              <a:t>11/28/10</a:t>
+              <a:t>11/29/10</a:t>
             </a:fld>
             <a:endParaRPr lang="en-US"/>
           </a:p>
@@ -2851,7 +2851,7 @@
             <a:fld id="{27AB7D46-BD5E-E641-9118-DCE28F3B83FA}" type="datetime1">
               <a:rPr lang="en-US" smtClean="0"/>
               <a:pPr/>
-              <a:t>11/28/10</a:t>
+              <a:t>11/29/10</a:t>
             </a:fld>
             <a:endParaRPr lang="en-US"/>
           </a:p>
@@ -3191,7 +3191,7 @@
             <a:fld id="{4C4AD4EB-88D0-C141-9474-CCD86A78CB94}" type="datetimeFigureOut">
               <a:rPr lang="en-US" smtClean="0"/>
               <a:pPr/>
-              <a:t>11/28/10</a:t>
+              <a:t>11/29/10</a:t>
             </a:fld>
             <a:endParaRPr lang="en-US"/>
           </a:p>
@@ -3315,7 +3315,7 @@
             <a:fld id="{4C4AD4EB-88D0-C141-9474-CCD86A78CB94}" type="datetimeFigureOut">
               <a:rPr lang="en-US" smtClean="0"/>
               <a:pPr/>
-              <a:t>11/28/10</a:t>
+              <a:t>11/29/10</a:t>
             </a:fld>
             <a:endParaRPr lang="en-US"/>
           </a:p>
@@ -3609,7 +3609,7 @@
             <a:fld id="{4C4AD4EB-88D0-C141-9474-CCD86A78CB94}" type="datetimeFigureOut">
               <a:rPr lang="en-US" smtClean="0"/>
               <a:pPr/>
-              <a:t>11/28/10</a:t>
+              <a:t>11/29/10</a:t>
             </a:fld>
             <a:endParaRPr lang="en-US"/>
           </a:p>
@@ -3861,7 +3861,7 @@
             <a:fld id="{BC26097E-015C-3B4D-86C1-CD2AD30F0B81}" type="datetime1">
               <a:rPr lang="en-US" smtClean="0"/>
               <a:pPr/>
-              <a:t>11/28/10</a:t>
+              <a:t>11/29/10</a:t>
             </a:fld>
             <a:endParaRPr lang="en-US"/>
           </a:p>
@@ -3958,7 +3958,7 @@
             <a:fld id="{4C4AD4EB-88D0-C141-9474-CCD86A78CB94}" type="datetimeFigureOut">
               <a:rPr lang="en-US" smtClean="0"/>
               <a:pPr/>
-              <a:t>11/28/10</a:t>
+              <a:t>11/29/10</a:t>
             </a:fld>
             <a:endParaRPr lang="en-US"/>
           </a:p>
@@ -4229,7 +4229,7 @@
             <a:fld id="{ED6649F4-2545-3040-B7BD-803CA59D50C7}" type="datetime1">
               <a:rPr lang="en-US" smtClean="0"/>
               <a:pPr/>
-              <a:t>11/28/10</a:t>
+              <a:t>11/29/10</a:t>
             </a:fld>
             <a:endParaRPr lang="en-US"/>
           </a:p>
@@ -4537,7 +4537,7 @@
             <a:fld id="{833A9088-CEDD-2F48-A9A0-611A3CC03FE9}" type="datetime1">
               <a:rPr lang="en-US" smtClean="0"/>
               <a:pPr/>
-              <a:t>11/28/10</a:t>
+              <a:t>11/29/10</a:t>
             </a:fld>
             <a:endParaRPr lang="en-US"/>
           </a:p>
@@ -4831,7 +4831,7 @@
             <a:fld id="{AED87ACF-EB3C-EA42-8610-542FB50388EB}" type="datetime1">
               <a:rPr lang="en-US" smtClean="0"/>
               <a:pPr/>
-              <a:t>11/28/10</a:t>
+              <a:t>11/29/10</a:t>
             </a:fld>
             <a:endParaRPr lang="en-US"/>
           </a:p>
@@ -5263,7 +5263,7 @@
             <a:fld id="{0E0DC31B-692F-774E-A937-DA560DE61DA8}" type="datetime1">
               <a:rPr lang="en-US" smtClean="0"/>
               <a:pPr/>
-              <a:t>11/28/10</a:t>
+              <a:t>11/29/10</a:t>
             </a:fld>
             <a:endParaRPr lang="en-US"/>
           </a:p>
@@ -5611,7 +5611,7 @@
             <a:fld id="{95DEFDAE-5BDC-1B4F-BC4C-23C867CEBC21}" type="datetime1">
               <a:rPr lang="en-US" smtClean="0"/>
               <a:pPr/>
-              <a:t>11/28/10</a:t>
+              <a:t>11/29/10</a:t>
             </a:fld>
             <a:endParaRPr lang="en-US"/>
           </a:p>
@@ -5703,7 +5703,7 @@
             <a:fld id="{9F53C516-787B-9A45-AFCF-5D75DD78DEBE}" type="datetime1">
               <a:rPr lang="en-US" smtClean="0"/>
               <a:pPr/>
-              <a:t>11/28/10</a:t>
+              <a:t>11/29/10</a:t>
             </a:fld>
             <a:endParaRPr lang="en-US"/>
           </a:p>
@@ -6042,7 +6042,7 @@
             <a:fld id="{F19CAA94-9393-BB4A-8CB6-008B1351A132}" type="datetime1">
               <a:rPr lang="en-US" smtClean="0"/>
               <a:pPr/>
-              <a:t>11/28/10</a:t>
+              <a:t>11/29/10</a:t>
             </a:fld>
             <a:endParaRPr lang="en-US"/>
           </a:p>
@@ -6256,7 +6256,7 @@
             <a:fld id="{A3476A5E-2ED6-7749-A8C1-D0B1EEEB97E0}" type="datetime1">
               <a:rPr lang="en-US" smtClean="0"/>
               <a:pPr/>
-              <a:t>11/28/10</a:t>
+              <a:t>11/29/10</a:t>
             </a:fld>
             <a:endParaRPr lang="en-US"/>
           </a:p>
@@ -7670,7 +7670,7 @@
             <a:fld id="{4C4AD4EB-88D0-C141-9474-CCD86A78CB94}" type="datetimeFigureOut">
               <a:rPr lang="en-US" smtClean="0"/>
               <a:pPr/>
-              <a:t>11/28/10</a:t>
+              <a:t>11/29/10</a:t>
             </a:fld>
             <a:endParaRPr lang="en-US"/>
           </a:p>
@@ -8345,7 +8345,7 @@
             <a:fld id="{4C4AD4EB-88D0-C141-9474-CCD86A78CB94}" type="datetimeFigureOut">
               <a:rPr lang="en-US" smtClean="0"/>
               <a:pPr/>
-              <a:t>11/28/10</a:t>
+              <a:t>11/29/10</a:t>
             </a:fld>
             <a:endParaRPr lang="en-US"/>
           </a:p>
@@ -8988,7 +8988,7 @@
             <a:fld id="{4C4AD4EB-88D0-C141-9474-CCD86A78CB94}" type="datetimeFigureOut">
               <a:rPr lang="en-US" smtClean="0"/>
               <a:pPr/>
-              <a:t>11/28/10</a:t>
+              <a:t>11/29/10</a:t>
             </a:fld>
             <a:endParaRPr lang="en-US"/>
           </a:p>
@@ -9631,7 +9631,7 @@
             <a:fld id="{4C4AD4EB-88D0-C141-9474-CCD86A78CB94}" type="datetimeFigureOut">
               <a:rPr lang="en-US" smtClean="0"/>
               <a:pPr/>
-              <a:t>11/28/10</a:t>
+              <a:t>11/29/10</a:t>
             </a:fld>
             <a:endParaRPr lang="en-US"/>
           </a:p>
@@ -10345,7 +10345,7 @@
       </p:grpSpPr>
       <p:sp>
         <p:nvSpPr>
-          <p:cNvPr id="2" name="Title 1"/>
+          <p:cNvPr id="5" name="Title 4"/>
           <p:cNvSpPr>
             <a:spLocks noGrp="1"/>
           </p:cNvSpPr>
@@ -10356,84 +10356,98 @@
         <p:spPr/>
         <p:txBody>
           <a:bodyPr>
-            <a:normAutofit fontScale="90000"/>
+            <a:noAutofit/>
           </a:bodyPr>
           <a:lstStyle/>
           <a:p>
             <a:r>
-              <a:rPr lang="en-US" dirty="0" smtClean="0"/>
-              <a:t>Understanding Distributed Programming Models </a:t>
-            </a:r>
-            <a:endParaRPr lang="en-US" dirty="0"/>
+              <a:rPr lang="en-US" sz="2400" dirty="0" smtClean="0"/>
+              <a:t>SAGA: Develop applications that are distributed by definition</a:t>
+            </a:r>
+            <a:endParaRPr lang="en-US" sz="2400" dirty="0"/>
+          </a:p>
+        </p:txBody>
+      </p:sp>
+      <p:sp>
+        <p:nvSpPr>
+          <p:cNvPr id="6" name="Content Placeholder 5"/>
+          <p:cNvSpPr>
+            <a:spLocks noGrp="1"/>
+          </p:cNvSpPr>
+          <p:nvPr>
+            <p:ph sz="half" idx="2"/>
+          </p:nvPr>
+        </p:nvSpPr>
+        <p:spPr>
+          <a:xfrm>
+            <a:off x="406400" y="1397001"/>
+            <a:ext cx="4495800" cy="4978399"/>
+          </a:xfrm>
+        </p:spPr>
+        <p:txBody>
+          <a:bodyPr>
+            <a:normAutofit/>
+          </a:bodyPr>
+          <a:lstStyle/>
+          <a:p>
+            <a:r>
+              <a:rPr lang="en-US" sz="1700" dirty="0" smtClean="0"/>
+              <a:t>How to develop a simple MR that is interoperable across infrastructure concurrently?</a:t>
+            </a:r>
+          </a:p>
+          <a:p>
+            <a:r>
+              <a:rPr lang="en-US" sz="1700" dirty="0" smtClean="0"/>
+              <a:t>Same application, same programming model:</a:t>
+            </a:r>
+          </a:p>
+          <a:p>
+            <a:pPr lvl="1"/>
+            <a:r>
+              <a:rPr lang="en-US" sz="1700" dirty="0" smtClean="0"/>
+              <a:t>Very different performance dependence</a:t>
+            </a:r>
+          </a:p>
+          <a:p>
+            <a:r>
+              <a:rPr lang="en-US" sz="1700" dirty="0" smtClean="0"/>
+              <a:t>Same application, different programming models</a:t>
+            </a:r>
+          </a:p>
+          <a:p>
+            <a:pPr lvl="1"/>
+            <a:r>
+              <a:rPr lang="en-US" sz="1700" dirty="0" smtClean="0"/>
+              <a:t>Very different performance dependence</a:t>
+            </a:r>
+          </a:p>
+          <a:p>
+            <a:pPr lvl="1">
+              <a:buNone/>
+            </a:pPr>
+            <a:endParaRPr lang="en-US" sz="1700" dirty="0" smtClean="0"/>
           </a:p>
         </p:txBody>
       </p:sp>
       <p:pic>
         <p:nvPicPr>
-          <p:cNvPr id="4" name="Content Placeholder 3" descr="sphere_varying_workers.png"/>
+          <p:cNvPr id="7" name="Content Placeholder 3" descr="saga_mapreduce_schema.png"/>
           <p:cNvPicPr>
-            <a:picLocks noGrp="1" noChangeAspect="1"/>
+            <a:picLocks noChangeAspect="1"/>
           </p:cNvPicPr>
-          <p:nvPr>
-            <p:ph idx="1"/>
-          </p:nvPr>
+          <p:nvPr/>
         </p:nvPicPr>
         <p:blipFill>
           <a:blip r:embed="rId2"/>
-          <a:srcRect l="-14268" r="-14268"/>
+          <a:srcRect l="-10578" r="-10578"/>
           <a:stretch>
             <a:fillRect/>
           </a:stretch>
         </p:blipFill>
         <p:spPr>
           <a:xfrm>
-            <a:off x="4129450" y="1817641"/>
-            <a:ext cx="5014551" cy="2731106"/>
-          </a:xfrm>
-        </p:spPr>
-      </p:pic>
-      <p:pic>
-        <p:nvPicPr>
-          <p:cNvPr id="5" name="Picture 4" descr="sagamr_varying_workers.png"/>
-          <p:cNvPicPr>
-            <a:picLocks noChangeAspect="1"/>
-          </p:cNvPicPr>
-          <p:nvPr/>
-        </p:nvPicPr>
-        <p:blipFill>
-          <a:blip r:embed="rId3"/>
-          <a:stretch>
-            <a:fillRect/>
-          </a:stretch>
-        </p:blipFill>
-        <p:spPr>
-          <a:xfrm>
-            <a:off x="4746883" y="4310827"/>
-            <a:ext cx="3827804" cy="2547174"/>
-          </a:xfrm>
-          <a:prstGeom prst="rect">
-            <a:avLst/>
-          </a:prstGeom>
-        </p:spPr>
-      </p:pic>
-      <p:pic>
-        <p:nvPicPr>
-          <p:cNvPr id="6" name="Picture 5" descr="sphere_mr_varying_chunksize.png"/>
-          <p:cNvPicPr>
-            <a:picLocks noChangeAspect="1"/>
-          </p:cNvPicPr>
-          <p:nvPr/>
-        </p:nvPicPr>
-        <p:blipFill>
-          <a:blip r:embed="rId4"/>
-          <a:stretch>
-            <a:fillRect/>
-          </a:stretch>
-        </p:blipFill>
-        <p:spPr>
-          <a:xfrm>
-            <a:off x="1" y="2465574"/>
-            <a:ext cx="4571429" cy="3200000"/>
+            <a:off x="4368801" y="1592712"/>
+            <a:ext cx="4632959" cy="4782688"/>
           </a:xfrm>
           <a:prstGeom prst="rect">
             <a:avLst/>
@@ -10484,149 +10498,91 @@
         </p:nvSpPr>
         <p:spPr/>
         <p:txBody>
-          <a:bodyPr rtlCol="0">
-            <a:normAutofit/>
+          <a:bodyPr>
+            <a:normAutofit fontScale="90000"/>
           </a:bodyPr>
           <a:lstStyle/>
           <a:p>
-            <a:pPr>
-              <a:defRPr/>
-            </a:pPr>
-            <a:r>
-              <a:rPr lang="en-US" sz="2200" dirty="0" smtClean="0"/>
-              <a:t>Distributed Adaptive Replica Exchange (DARE)</a:t>
-            </a:r>
             <a:r>
               <a:rPr lang="en-US" dirty="0" smtClean="0"/>
-              <a:t/>
-            </a:r>
-            <a:br>
-              <a:rPr lang="en-US" dirty="0" smtClean="0"/>
-            </a:br>
-            <a:r>
-              <a:rPr lang="en-US" sz="2200" dirty="0" smtClean="0"/>
-              <a:t>Multiple Pilot-Jobs on the “Distributed” </a:t>
-            </a:r>
-            <a:r>
-              <a:rPr lang="en-US" sz="2200" dirty="0" err="1" smtClean="0"/>
-              <a:t>TeraGrid</a:t>
-            </a:r>
-            <a:endParaRPr lang="en-US" sz="2200" dirty="0" smtClean="0">
-              <a:solidFill>
-                <a:srgbClr val="800000"/>
-              </a:solidFill>
-              <a:latin typeface="Cooper Black"/>
-              <a:cs typeface="Cooper Black"/>
-            </a:endParaRPr>
-          </a:p>
-        </p:txBody>
-      </p:sp>
-      <p:sp>
-        <p:nvSpPr>
-          <p:cNvPr id="8" name="Content Placeholder 7"/>
-          <p:cNvSpPr>
-            <a:spLocks noGrp="1"/>
-          </p:cNvSpPr>
+              <a:t>Understanding Distributed Programming Models </a:t>
+            </a:r>
+            <a:endParaRPr lang="en-US" dirty="0"/>
+          </a:p>
+        </p:txBody>
+      </p:sp>
+      <p:pic>
+        <p:nvPicPr>
+          <p:cNvPr id="4" name="Content Placeholder 3" descr="sphere_varying_workers.png"/>
+          <p:cNvPicPr>
+            <a:picLocks noGrp="1" noChangeAspect="1"/>
+          </p:cNvPicPr>
           <p:nvPr>
             <p:ph idx="1"/>
           </p:nvPr>
-        </p:nvSpPr>
+        </p:nvPicPr>
+        <p:blipFill>
+          <a:blip r:embed="rId2"/>
+          <a:srcRect l="-14268" r="-14268"/>
+          <a:stretch>
+            <a:fillRect/>
+          </a:stretch>
+        </p:blipFill>
         <p:spPr>
           <a:xfrm>
-            <a:off x="892711" y="2011973"/>
-            <a:ext cx="7489289" cy="1366228"/>
+            <a:off x="4129450" y="1817641"/>
+            <a:ext cx="5014551" cy="2731106"/>
           </a:xfrm>
         </p:spPr>
-        <p:txBody>
-          <a:bodyPr>
-            <a:normAutofit/>
-          </a:bodyPr>
-          <a:lstStyle/>
-          <a:p>
-            <a:r>
-              <a:rPr lang="en-US" dirty="0" smtClean="0"/>
-              <a:t>Ability to dynamically add HPC resources. On TG:</a:t>
-            </a:r>
-          </a:p>
-          <a:p>
-            <a:r>
-              <a:rPr lang="en-US" dirty="0" smtClean="0"/>
-              <a:t>Innovations in Distributed Algorithms:</a:t>
-            </a:r>
-          </a:p>
-          <a:p>
-            <a:pPr lvl="1"/>
-            <a:r>
-              <a:rPr lang="en-US" dirty="0" smtClean="0"/>
-              <a:t>Variants of  RE: Sync (local) </a:t>
-            </a:r>
-            <a:r>
-              <a:rPr lang="en-US" dirty="0" err="1" smtClean="0"/>
-              <a:t>vs</a:t>
-            </a:r>
-            <a:r>
-              <a:rPr lang="en-US" dirty="0" smtClean="0"/>
-              <a:t> </a:t>
-            </a:r>
-            <a:r>
-              <a:rPr lang="en-US" dirty="0" err="1" smtClean="0"/>
-              <a:t>async</a:t>
-            </a:r>
-            <a:r>
-              <a:rPr lang="en-US" dirty="0" smtClean="0"/>
-              <a:t> (distr.)</a:t>
-            </a:r>
-          </a:p>
-        </p:txBody>
-      </p:sp>
+      </p:pic>
       <p:pic>
         <p:nvPicPr>
-          <p:cNvPr id="37894" name="Picture 7" descr="perf_distributed_number_replica-1.pdf"/>
+          <p:cNvPr id="5" name="Picture 4" descr="sagamr_varying_workers.png"/>
           <p:cNvPicPr>
             <a:picLocks noChangeAspect="1"/>
           </p:cNvPicPr>
           <p:nvPr/>
         </p:nvPicPr>
         <p:blipFill>
-          <a:blip r:embed="rId2"/>
-          <a:srcRect/>
+          <a:blip r:embed="rId3"/>
           <a:stretch>
             <a:fillRect/>
           </a:stretch>
         </p:blipFill>
-        <p:spPr bwMode="auto">
+        <p:spPr>
           <a:xfrm>
-            <a:off x="626011" y="3746500"/>
-            <a:ext cx="3657600" cy="2552700"/>
+            <a:off x="4746883" y="4310827"/>
+            <a:ext cx="3827804" cy="2547174"/>
           </a:xfrm>
           <a:prstGeom prst="rect">
             <a:avLst/>
           </a:prstGeom>
-          <a:noFill/>
-          <a:ln w="9525">
-            <a:noFill/>
-            <a:miter lim="800000"/>
-            <a:headEnd/>
-            <a:tailEnd/>
-          </a:ln>
         </p:spPr>
       </p:pic>
-      <p:graphicFrame>
-        <p:nvGraphicFramePr>
-          <p:cNvPr id="7" name="Chart 6"/>
-          <p:cNvGraphicFramePr/>
+      <p:pic>
+        <p:nvPicPr>
+          <p:cNvPr id="6" name="Picture 5" descr="sphere_mr_varying_chunksize.png"/>
+          <p:cNvPicPr>
+            <a:picLocks noChangeAspect="1"/>
+          </p:cNvPicPr>
           <p:nvPr/>
-        </p:nvGraphicFramePr>
-        <p:xfrm>
-          <a:off x="4888047" y="3644900"/>
-          <a:ext cx="3935959" cy="3073400"/>
-        </p:xfrm>
-        <a:graphic>
-          <a:graphicData uri="http://schemas.openxmlformats.org/drawingml/2006/chart">
-            <c:chart xmlns:c="http://schemas.openxmlformats.org/drawingml/2006/chart" xmlns:r="http://schemas.openxmlformats.org/officeDocument/2006/relationships" r:id="rId3"/>
-          </a:graphicData>
-        </a:graphic>
-      </p:graphicFrame>
+        </p:nvPicPr>
+        <p:blipFill>
+          <a:blip r:embed="rId4"/>
+          <a:stretch>
+            <a:fillRect/>
+          </a:stretch>
+        </p:blipFill>
+        <p:spPr>
+          <a:xfrm>
+            <a:off x="1" y="2465574"/>
+            <a:ext cx="4571429" cy="3200000"/>
+          </a:xfrm>
+          <a:prstGeom prst="rect">
+            <a:avLst/>
+          </a:prstGeom>
+        </p:spPr>
+      </p:pic>
     </p:spTree>
   </p:cSld>
   <p:clrMapOvr>
@@ -10678,7 +10634,11 @@
           <a:p>
             <a:r>
               <a:rPr lang="en-US" sz="2400" dirty="0" smtClean="0"/>
-              <a:t>SAGA: Tools for Effective Distributed Execution</a:t>
+              <a:t>2. Tools </a:t>
+            </a:r>
+            <a:r>
+              <a:rPr lang="en-US" sz="2400" dirty="0" smtClean="0"/>
+              <a:t>for Effective Distributed Execution</a:t>
             </a:r>
             <a:endParaRPr lang="en-US" sz="2400" dirty="0"/>
           </a:p>
@@ -10735,9 +10695,116 @@
           <a:chExt cx="0" cy="0"/>
         </a:xfrm>
       </p:grpSpPr>
+      <p:sp>
+        <p:nvSpPr>
+          <p:cNvPr id="2" name="Title 1"/>
+          <p:cNvSpPr>
+            <a:spLocks noGrp="1"/>
+          </p:cNvSpPr>
+          <p:nvPr>
+            <p:ph type="title"/>
+          </p:nvPr>
+        </p:nvSpPr>
+        <p:spPr/>
+        <p:txBody>
+          <a:bodyPr rtlCol="0">
+            <a:normAutofit/>
+          </a:bodyPr>
+          <a:lstStyle/>
+          <a:p>
+            <a:pPr>
+              <a:defRPr/>
+            </a:pPr>
+            <a:r>
+              <a:rPr lang="en-US" sz="2200" dirty="0" smtClean="0"/>
+              <a:t>Distributed Adaptive Replica Exchange (DARE)</a:t>
+            </a:r>
+            <a:r>
+              <a:rPr lang="en-US" dirty="0" smtClean="0"/>
+              <a:t/>
+            </a:r>
+            <a:br>
+              <a:rPr lang="en-US" dirty="0" smtClean="0"/>
+            </a:br>
+            <a:r>
+              <a:rPr lang="en-US" sz="2200" dirty="0" smtClean="0"/>
+              <a:t>Multiple Pilot-Jobs on the “Distributed” </a:t>
+            </a:r>
+            <a:r>
+              <a:rPr lang="en-US" sz="2200" dirty="0" err="1" smtClean="0"/>
+              <a:t>TeraGrid</a:t>
+            </a:r>
+            <a:endParaRPr lang="en-US" sz="2200" dirty="0" smtClean="0">
+              <a:solidFill>
+                <a:srgbClr val="800000"/>
+              </a:solidFill>
+              <a:latin typeface="Cooper Black"/>
+              <a:cs typeface="Cooper Black"/>
+            </a:endParaRPr>
+          </a:p>
+        </p:txBody>
+      </p:sp>
+      <p:sp>
+        <p:nvSpPr>
+          <p:cNvPr id="8" name="Content Placeholder 7"/>
+          <p:cNvSpPr>
+            <a:spLocks noGrp="1"/>
+          </p:cNvSpPr>
+          <p:nvPr>
+            <p:ph idx="1"/>
+          </p:nvPr>
+        </p:nvSpPr>
+        <p:spPr>
+          <a:xfrm>
+            <a:off x="892711" y="2011973"/>
+            <a:ext cx="7489289" cy="1366228"/>
+          </a:xfrm>
+        </p:spPr>
+        <p:txBody>
+          <a:bodyPr>
+            <a:normAutofit/>
+          </a:bodyPr>
+          <a:lstStyle/>
+          <a:p>
+            <a:r>
+              <a:rPr lang="en-US" dirty="0" smtClean="0"/>
+              <a:t>Ability to dynamically add HPC resources. On TG:</a:t>
+            </a:r>
+          </a:p>
+          <a:p>
+            <a:r>
+              <a:rPr lang="en-US" dirty="0" smtClean="0"/>
+              <a:t>Innovations in Distributed Algorithms:</a:t>
+            </a:r>
+          </a:p>
+          <a:p>
+            <a:pPr lvl="1"/>
+            <a:r>
+              <a:rPr lang="en-US" dirty="0" smtClean="0"/>
+              <a:t>Variants of  RE: Sync (local) </a:t>
+            </a:r>
+            <a:r>
+              <a:rPr lang="en-US" dirty="0" err="1" smtClean="0"/>
+              <a:t>vs</a:t>
+            </a:r>
+            <a:r>
+              <a:rPr lang="en-US" dirty="0" smtClean="0"/>
+              <a:t> </a:t>
+            </a:r>
+            <a:r>
+              <a:rPr lang="en-US" dirty="0" err="1" smtClean="0"/>
+              <a:t>async</a:t>
+            </a:r>
+            <a:r>
+              <a:rPr lang="en-US" dirty="0" smtClean="0"/>
+              <a:t> (distr.)</a:t>
+            </a:r>
+          </a:p>
+        </p:txBody>
+      </p:sp>
       <p:pic>
         <p:nvPicPr>
-          <p:cNvPr id="87042" name="Picture 1" descr="Picture 2.png"/>
+          <p:cNvPr id="37894" name="Picture 7" descr="perf_distributed_number_replica-1.pdf"/>
           <p:cNvPicPr>
             <a:picLocks noChangeAspect="1"/>
           </p:cNvPicPr>
@@ -10752,8 +10819,8 @@
         </p:blipFill>
         <p:spPr bwMode="auto">
           <a:xfrm>
-            <a:off x="192088" y="1016000"/>
-            <a:ext cx="8799512" cy="5232400"/>
+            <a:off x="626011" y="3746500"/>
+            <a:ext cx="3657600" cy="2552700"/>
           </a:xfrm>
           <a:prstGeom prst="rect">
             <a:avLst/>
@@ -10767,50 +10834,27 @@
           </a:ln>
         </p:spPr>
       </p:pic>
-      <p:sp>
-        <p:nvSpPr>
-          <p:cNvPr id="5" name="Title 4"/>
-          <p:cNvSpPr>
-            <a:spLocks noGrp="1"/>
-          </p:cNvSpPr>
-          <p:nvPr>
-            <p:ph type="title"/>
-          </p:nvPr>
-        </p:nvSpPr>
-        <p:spPr>
-          <a:xfrm>
-            <a:off x="25401" y="133256"/>
-            <a:ext cx="8913813" cy="914400"/>
-          </a:xfrm>
-        </p:spPr>
-        <p:txBody>
-          <a:bodyPr>
-            <a:normAutofit fontScale="90000"/>
-          </a:bodyPr>
-          <a:lstStyle/>
-          <a:p>
-            <a:r>
-              <a:rPr lang="en-US" dirty="0" smtClean="0"/>
-              <a:t>SAGA: Provides uniform access layers to </a:t>
-            </a:r>
-            <a:r>
-              <a:rPr lang="en-US" dirty="0" err="1" smtClean="0"/>
-              <a:t>heterogenous</a:t>
-            </a:r>
-            <a:r>
-              <a:rPr lang="en-US" dirty="0" smtClean="0"/>
-              <a:t> CI</a:t>
-            </a:r>
-            <a:endParaRPr lang="en-US" dirty="0"/>
-          </a:p>
-        </p:txBody>
-      </p:sp>
+      <p:graphicFrame>
+        <p:nvGraphicFramePr>
+          <p:cNvPr id="7" name="Chart 6"/>
+          <p:cNvGraphicFramePr/>
+          <p:nvPr/>
+        </p:nvGraphicFramePr>
+        <p:xfrm>
+          <a:off x="4888047" y="3644900"/>
+          <a:ext cx="3935959" cy="3073400"/>
+        </p:xfrm>
+        <a:graphic>
+          <a:graphicData uri="http://schemas.openxmlformats.org/drawingml/2006/chart">
+            <c:chart xmlns:c="http://schemas.openxmlformats.org/drawingml/2006/chart" xmlns:r="http://schemas.openxmlformats.org/officeDocument/2006/relationships" r:id="rId3"/>
+          </a:graphicData>
+        </a:graphic>
+      </p:graphicFrame>
     </p:spTree>
   </p:cSld>
   <p:clrMapOvr>
     <a:masterClrMapping/>
   </p:clrMapOvr>
-  <p:transition/>
   <p:timing>
     <p:tnLst>
       <p:par>
@@ -10840,7 +10884,7 @@
       </p:grpSpPr>
       <p:pic>
         <p:nvPicPr>
-          <p:cNvPr id="2" name="Picture 1" descr="mandelbrot-9.png"/>
+          <p:cNvPr id="87042" name="Picture 1" descr="Picture 2.png"/>
           <p:cNvPicPr>
             <a:picLocks noChangeAspect="1"/>
           </p:cNvPicPr>
@@ -10848,23 +10892,31 @@
         </p:nvPicPr>
         <p:blipFill>
           <a:blip r:embed="rId2"/>
+          <a:srcRect/>
           <a:stretch>
             <a:fillRect/>
           </a:stretch>
         </p:blipFill>
-        <p:spPr>
+        <p:spPr bwMode="auto">
           <a:xfrm>
-            <a:off x="1058415" y="1287404"/>
-            <a:ext cx="8089359" cy="5570597"/>
+            <a:off x="192088" y="1016000"/>
+            <a:ext cx="8799512" cy="5232400"/>
           </a:xfrm>
           <a:prstGeom prst="rect">
             <a:avLst/>
           </a:prstGeom>
+          <a:noFill/>
+          <a:ln w="9525">
+            <a:noFill/>
+            <a:miter lim="800000"/>
+            <a:headEnd/>
+            <a:tailEnd/>
+          </a:ln>
         </p:spPr>
       </p:pic>
       <p:sp>
         <p:nvSpPr>
-          <p:cNvPr id="3" name="Title 2"/>
+          <p:cNvPr id="5" name="Title 4"/>
           <p:cNvSpPr>
             <a:spLocks noGrp="1"/>
           </p:cNvSpPr>
@@ -10872,18 +10924,35 @@
             <p:ph type="title"/>
           </p:nvPr>
         </p:nvSpPr>
-        <p:spPr/>
+        <p:spPr>
+          <a:xfrm>
+            <a:off x="25401" y="133256"/>
+            <a:ext cx="8913813" cy="914400"/>
+          </a:xfrm>
+        </p:spPr>
         <p:txBody>
           <a:bodyPr>
-            <a:noAutofit/>
+            <a:normAutofit fontScale="90000"/>
           </a:bodyPr>
           <a:lstStyle/>
           <a:p>
             <a:r>
-              <a:rPr lang="en-US" sz="2400" dirty="0" smtClean="0"/>
-              <a:t>SAGA: To provide uniform access layers to heterogeneous CI</a:t>
-            </a:r>
-            <a:endParaRPr lang="en-US" sz="2400" dirty="0"/>
+              <a:rPr lang="en-US" dirty="0" smtClean="0"/>
+              <a:t>3. </a:t>
+            </a:r>
+            <a:r>
+              <a:rPr lang="en-US" dirty="0" smtClean="0"/>
+              <a:t>Provides uniform access layers to </a:t>
+            </a:r>
+            <a:r>
+              <a:rPr lang="en-US" dirty="0" err="1" smtClean="0"/>
+              <a:t>heterogenous</a:t>
+            </a:r>
+            <a:r>
+              <a:rPr lang="en-US" dirty="0" smtClean="0"/>
+              <a:t> CI</a:t>
+            </a:r>
+            <a:endParaRPr lang="en-US" dirty="0"/>
           </a:p>
         </p:txBody>
       </p:sp>
@@ -10892,6 +10961,7 @@
   <p:clrMapOvr>
     <a:masterClrMapping/>
   </p:clrMapOvr>
+  <p:transition/>
   <p:timing>
     <p:tnLst>
       <p:par>
@@ -14513,8 +14583,8 @@
         </p:nvSpPr>
         <p:spPr>
           <a:xfrm>
-            <a:off x="1" y="3820210"/>
-            <a:ext cx="4168024" cy="1569656"/>
+            <a:off x="1" y="3627444"/>
+            <a:ext cx="4168024" cy="3416316"/>
           </a:xfrm>
           <a:prstGeom prst="rect">
             <a:avLst/>
@@ -14552,8 +14622,29 @@
             </a:pPr>
             <a:r>
               <a:rPr lang="en-US" sz="2400" dirty="0" smtClean="0"/>
-              <a:t> Balanced: Scale-Up and Scale-out to</a:t>
-            </a:r>
+              <a:t> Balanced: Scale-Up and Scale-out </a:t>
+            </a:r>
+            <a:r>
+              <a:rPr lang="en-US" sz="2400" dirty="0" smtClean="0"/>
+              <a:t>to</a:t>
+            </a:r>
+          </a:p>
+          <a:p>
+            <a:pPr>
+              <a:buFont typeface="Arial"/>
+              <a:buChar char="•"/>
+            </a:pPr>
+            <a:r>
+              <a:rPr lang="en-US" sz="2400" dirty="0" smtClean="0"/>
+              <a:t>DARE-RFOLD, DOCK, Bioscope (NG Sequence Data), STMD (Molecular Dynamics)</a:t>
+            </a:r>
+          </a:p>
+          <a:p>
+            <a:pPr>
+              <a:buFont typeface="Arial"/>
+              <a:buChar char="•"/>
+            </a:pPr>
+            <a:endParaRPr lang="en-US" sz="2400" dirty="0" smtClean="0"/>
           </a:p>
         </p:txBody>
       </p:sp>
@@ -14773,13 +14864,7 @@
               <a:rPr lang="en-US" dirty="0" smtClean="0">
                 <a:hlinkClick r:id="rId3"/>
               </a:rPr>
-              <a:t>http:/</a:t>
-            </a:r>
-            <a:r>
-              <a:rPr lang="en-US" dirty="0" smtClean="0">
-                <a:hlinkClick r:id="rId3"/>
-              </a:rPr>
-              <a:t>/saga. cct.lsu.edu/</a:t>
+              <a:t>http://saga. cct.lsu.edu/</a:t>
             </a:r>
             <a:endParaRPr lang="en-US" dirty="0" smtClean="0"/>
           </a:p>
@@ -14793,11 +14878,7 @@
             <a:pPr lvl="1"/>
             <a:r>
               <a:rPr lang="en-US" dirty="0" smtClean="0"/>
-              <a:t>http</a:t>
-            </a:r>
-            <a:r>
-              <a:rPr lang="en-US" dirty="0" smtClean="0"/>
-              <a:t>://</a:t>
+              <a:t>http://</a:t>
             </a:r>
             <a:r>
               <a:rPr lang="en-US" dirty="0" err="1" smtClean="0"/>
@@ -14866,11 +14947,7 @@
             <a:pPr marL="207880"/>
             <a:r>
               <a:rPr lang="en-US" dirty="0" smtClean="0"/>
-              <a:t>Programmers</a:t>
-            </a:r>
-            <a:r>
-              <a:rPr lang="en-US" dirty="0" smtClean="0"/>
-              <a:t> Guide:</a:t>
+              <a:t>Programmers Guide:</a:t>
             </a:r>
           </a:p>
           <a:p>
@@ -14924,8 +15001,16 @@
           <a:lstStyle/>
           <a:p>
             <a:r>
-              <a:rPr lang="en-US" smtClean="0"/>
-              <a:t>November FIXME, 2010</a:t>
+              <a:rPr lang="en-US" dirty="0" smtClean="0"/>
+              <a:t>November</a:t>
+            </a:r>
+            <a:r>
+              <a:rPr lang="en-US" dirty="0" smtClean="0"/>
+              <a:t> 29, </a:t>
+            </a:r>
+            <a:r>
+              <a:rPr lang="en-US" dirty="0" smtClean="0"/>
+              <a:t>2010</a:t>
             </a:r>
             <a:endParaRPr lang="en-US" dirty="0"/>
           </a:p>
@@ -15891,7 +15976,38 @@
             </a:r>
             <a:r>
               <a:rPr lang="en-US" dirty="0" smtClean="0"/>
-              <a:t> scripting)</a:t>
+              <a:t> scripting</a:t>
+            </a:r>
+            <a:r>
+              <a:rPr lang="en-US" dirty="0" smtClean="0"/>
+              <a:t>)</a:t>
+            </a:r>
+          </a:p>
+          <a:p>
+            <a:pPr lvl="2"/>
+            <a:r>
+              <a:rPr lang="en-US" dirty="0" smtClean="0"/>
+              <a:t>MW </a:t>
+            </a:r>
+            <a:r>
+              <a:rPr lang="en-US" dirty="0" smtClean="0"/>
+              <a:t>applications</a:t>
+            </a:r>
+            <a:r>
+              <a:rPr lang="en-US" dirty="0" smtClean="0"/>
+              <a:t>,</a:t>
+            </a:r>
+            <a:r>
+              <a:rPr lang="en-US" dirty="0" smtClean="0"/>
+              <a:t> </a:t>
+            </a:r>
+            <a:r>
+              <a:rPr lang="en-US" dirty="0" smtClean="0"/>
+              <a:t>workers </a:t>
+            </a:r>
+            <a:r>
+              <a:rPr lang="en-US" dirty="0" smtClean="0"/>
+              <a:t>submitted to &gt;8 back-ends </a:t>
             </a:r>
           </a:p>
           <a:p>
@@ -15944,13 +16060,10 @@
               <a:t>SAGA: To provide uniform access layers to </a:t>
             </a:r>
             <a:r>
-              <a:rPr lang="en-US" dirty="0" err="1" smtClean="0"/>
-              <a:t>heter</a:t>
-            </a:r>
-            <a:r>
               <a:rPr lang="en-US" dirty="0" smtClean="0"/>
-              <a:t>. CI</a:t>
-            </a:r>
+              <a:t>heterogeneous CI</a:t>
+            </a:r>
+            <a:endParaRPr lang="en-US" dirty="0" smtClean="0"/>
           </a:p>
           <a:p>
             <a:pPr lvl="1"/>
@@ -15987,7 +16100,11 @@
             <a:pPr lvl="1"/>
             <a:r>
               <a:rPr lang="en-US" dirty="0" smtClean="0"/>
-              <a:t>Simplify the building of tools and Gateways or MW applications, workers submitted to &gt;8 back-ends </a:t>
+              <a:t>Simplify the building of tools and </a:t>
+            </a:r>
+            <a:r>
+              <a:rPr lang="en-US" dirty="0" smtClean="0"/>
+              <a:t>Gateways</a:t>
             </a:r>
             <a:endParaRPr lang="en-US" dirty="0"/>
           </a:p>
@@ -16025,95 +16142,9 @@
           <a:chExt cx="0" cy="0"/>
         </a:xfrm>
       </p:grpSpPr>
-      <p:sp>
-        <p:nvSpPr>
-          <p:cNvPr id="5" name="Title 4"/>
-          <p:cNvSpPr>
-            <a:spLocks noGrp="1"/>
-          </p:cNvSpPr>
-          <p:nvPr>
-            <p:ph type="title"/>
-          </p:nvPr>
-        </p:nvSpPr>
-        <p:spPr/>
-        <p:txBody>
-          <a:bodyPr>
-            <a:noAutofit/>
-          </a:bodyPr>
-          <a:lstStyle/>
-          <a:p>
-            <a:r>
-              <a:rPr lang="en-US" sz="2400" dirty="0" smtClean="0"/>
-              <a:t>SAGA: Develop applications that are distributed by definition</a:t>
-            </a:r>
-            <a:endParaRPr lang="en-US" sz="2400" dirty="0"/>
-          </a:p>
-        </p:txBody>
-      </p:sp>
-      <p:sp>
-        <p:nvSpPr>
-          <p:cNvPr id="6" name="Content Placeholder 5"/>
-          <p:cNvSpPr>
-            <a:spLocks noGrp="1"/>
-          </p:cNvSpPr>
-          <p:nvPr>
-            <p:ph sz="half" idx="2"/>
-          </p:nvPr>
-        </p:nvSpPr>
-        <p:spPr>
-          <a:xfrm>
-            <a:off x="406400" y="1397001"/>
-            <a:ext cx="4495800" cy="4978399"/>
-          </a:xfrm>
-        </p:spPr>
-        <p:txBody>
-          <a:bodyPr>
-            <a:normAutofit/>
-          </a:bodyPr>
-          <a:lstStyle/>
-          <a:p>
-            <a:r>
-              <a:rPr lang="en-US" sz="1700" dirty="0" smtClean="0"/>
-              <a:t>How to develop a simple MR that is interoperable across infrastructure concurrently?</a:t>
-            </a:r>
-          </a:p>
-          <a:p>
-            <a:r>
-              <a:rPr lang="en-US" sz="1700" dirty="0" smtClean="0"/>
-              <a:t>Same application, same programming model:</a:t>
-            </a:r>
-          </a:p>
-          <a:p>
-            <a:pPr lvl="1"/>
-            <a:r>
-              <a:rPr lang="en-US" sz="1700" dirty="0" smtClean="0"/>
-              <a:t>Very different performance dependence</a:t>
-            </a:r>
-          </a:p>
-          <a:p>
-            <a:r>
-              <a:rPr lang="en-US" sz="1700" dirty="0" smtClean="0"/>
-              <a:t>Same application, different programming models</a:t>
-            </a:r>
-          </a:p>
-          <a:p>
-            <a:pPr lvl="1"/>
-            <a:r>
-              <a:rPr lang="en-US" sz="1700" dirty="0" smtClean="0"/>
-              <a:t>Very different performance dependence</a:t>
-            </a:r>
-          </a:p>
-          <a:p>
-            <a:pPr lvl="1">
-              <a:buNone/>
-            </a:pPr>
-            <a:endParaRPr lang="en-US" sz="1700" dirty="0" smtClean="0"/>
-          </a:p>
-        </p:txBody>
-      </p:sp>
       <p:pic>
         <p:nvPicPr>
-          <p:cNvPr id="7" name="Content Placeholder 3" descr="saga_mapreduce_schema.png"/>
+          <p:cNvPr id="2" name="Picture 1" descr="mandelbrot-9.png"/>
           <p:cNvPicPr>
             <a:picLocks noChangeAspect="1"/>
           </p:cNvPicPr>
@@ -16121,21 +16152,57 @@
         </p:nvPicPr>
         <p:blipFill>
           <a:blip r:embed="rId2"/>
-          <a:srcRect l="-10578" r="-10578"/>
           <a:stretch>
             <a:fillRect/>
           </a:stretch>
         </p:blipFill>
         <p:spPr>
           <a:xfrm>
-            <a:off x="4368801" y="1592712"/>
-            <a:ext cx="4632959" cy="4782688"/>
+            <a:off x="1058415" y="1287404"/>
+            <a:ext cx="8089359" cy="5570597"/>
           </a:xfrm>
           <a:prstGeom prst="rect">
             <a:avLst/>
           </a:prstGeom>
         </p:spPr>
       </p:pic>
+      <p:sp>
+        <p:nvSpPr>
+          <p:cNvPr id="3" name="Title 2"/>
+          <p:cNvSpPr>
+            <a:spLocks noGrp="1"/>
+          </p:cNvSpPr>
+          <p:nvPr>
+            <p:ph type="title"/>
+          </p:nvPr>
+        </p:nvSpPr>
+        <p:spPr/>
+        <p:txBody>
+          <a:bodyPr>
+            <a:noAutofit/>
+          </a:bodyPr>
+          <a:lstStyle/>
+          <a:p>
+            <a:r>
+              <a:rPr lang="en-US" sz="2400" dirty="0" smtClean="0"/>
+              <a:t>1.  </a:t>
+            </a:r>
+            <a:r>
+              <a:rPr lang="en-US" sz="2400" dirty="0" smtClean="0"/>
+              <a:t>Develop </a:t>
+            </a:r>
+            <a:r>
+              <a:rPr lang="en-US" sz="2400" dirty="0" smtClean="0"/>
+              <a:t>applications that are distributed by </a:t>
+            </a:r>
+            <a:r>
+              <a:rPr lang="en-US" sz="2400" dirty="0" smtClean="0"/>
+              <a:t>definition</a:t>
+            </a:r>
+            <a:endParaRPr lang="en-US" sz="2400" dirty="0"/>
+          </a:p>
+        </p:txBody>
+      </p:sp>
     </p:spTree>
   </p:cSld>
   <p:clrMapOvr>

</xml_diff>